<commit_message>
68. Integrating Bookmarks Navigation
</commit_message>
<xml_diff>
--- a/Austin Layout.pptx
+++ b/Austin Layout.pptx
@@ -2,13 +2,15 @@
 <file path=ppt/presentation.xml><?xml version="1.0" encoding="utf-8"?>
 <p:presentation xmlns:a="http://schemas.openxmlformats.org/drawingml/2006/main" xmlns:r="http://schemas.openxmlformats.org/officeDocument/2006/relationships" xmlns:p="http://schemas.openxmlformats.org/presentationml/2006/main" saveSubsetFonts="1">
   <p:sldMasterIdLst>
-    <p:sldMasterId id="2147483678" r:id="rId1"/>
+    <p:sldMasterId id="2147483690" r:id="rId1"/>
   </p:sldMasterIdLst>
   <p:sldIdLst>
     <p:sldId id="256" r:id="rId2"/>
     <p:sldId id="257" r:id="rId3"/>
+    <p:sldId id="258" r:id="rId4"/>
+    <p:sldId id="259" r:id="rId5"/>
   </p:sldIdLst>
-  <p:sldSz cx="12192000" cy="6858000"/>
+  <p:sldSz cx="9144000" cy="5143500" type="screen16x9"/>
   <p:notesSz cx="6858000" cy="9144000"/>
   <p:defaultTextStyle>
     <a:defPPr>
@@ -105,13 +107,18 @@
       </a:defRPr>
     </a:lvl9pPr>
   </p:defaultTextStyle>
+  <p:extLst>
+    <p:ext uri="{EFAFB233-063F-42B5-8137-9DF3F51BA10A}">
+      <p15:sldGuideLst xmlns:p15="http://schemas.microsoft.com/office/powerpoint/2012/main"/>
+    </p:ext>
+  </p:extLst>
 </p:presentation>
 </file>
 
 <file path=ppt/revisionInfo.xml><?xml version="1.0" encoding="utf-8"?>
 <p1510:revInfo xmlns:a="http://schemas.openxmlformats.org/drawingml/2006/main" xmlns:r="http://schemas.openxmlformats.org/officeDocument/2006/relationships" xmlns:p1510="http://schemas.microsoft.com/office/powerpoint/2015/10/main">
   <p1510:revLst>
-    <p1510:client id="{B358E7AF-FE73-4324-BD5A-2E65502E3E1B}" v="13" dt="2025-04-18T09:17:05.007"/>
+    <p1510:client id="{B358E7AF-FE73-4324-BD5A-2E65502E3E1B}" v="25" dt="2025-04-20T08:41:41.223"/>
   </p1510:revLst>
 </p1510:revInfo>
 </file>
@@ -120,13 +127,13 @@
 <pc:chgInfo xmlns:a="http://schemas.openxmlformats.org/drawingml/2006/main" xmlns:r="http://schemas.openxmlformats.org/officeDocument/2006/relationships" xmlns:ac="http://schemas.microsoft.com/office/drawing/2013/main/command" xmlns:pc="http://schemas.microsoft.com/office/powerpoint/2013/main/command">
   <pc:docChgLst>
     <pc:chgData name="Gwizdek, Marcin" userId="b5cdd603-ee13-451a-a66f-f38407a19f3f" providerId="ADAL" clId="{B358E7AF-FE73-4324-BD5A-2E65502E3E1B}"/>
-    <pc:docChg chg="custSel addSld modSld">
-      <pc:chgData name="Gwizdek, Marcin" userId="b5cdd603-ee13-451a-a66f-f38407a19f3f" providerId="ADAL" clId="{B358E7AF-FE73-4324-BD5A-2E65502E3E1B}" dt="2025-04-18T09:17:48.577" v="1074" actId="6559"/>
+    <pc:docChg chg="undo custSel addSld delSld modSld">
+      <pc:chgData name="Gwizdek, Marcin" userId="b5cdd603-ee13-451a-a66f-f38407a19f3f" providerId="ADAL" clId="{B358E7AF-FE73-4324-BD5A-2E65502E3E1B}" dt="2025-04-20T08:41:52.462" v="1143" actId="207"/>
       <pc:docMkLst>
         <pc:docMk/>
       </pc:docMkLst>
       <pc:sldChg chg="addSp delSp modSp add mod setBg">
-        <pc:chgData name="Gwizdek, Marcin" userId="b5cdd603-ee13-451a-a66f-f38407a19f3f" providerId="ADAL" clId="{B358E7AF-FE73-4324-BD5A-2E65502E3E1B}" dt="2025-04-18T09:17:48.577" v="1074" actId="6559"/>
+        <pc:chgData name="Gwizdek, Marcin" userId="b5cdd603-ee13-451a-a66f-f38407a19f3f" providerId="ADAL" clId="{B358E7AF-FE73-4324-BD5A-2E65502E3E1B}" dt="2025-04-20T08:40:52.342" v="1136" actId="207"/>
         <pc:sldMkLst>
           <pc:docMk/>
           <pc:sldMk cId="3436750217" sldId="257"/>
@@ -139,12 +146,28 @@
             <ac:spMk id="2" creationId="{516E40E8-8D38-9D9A-FD33-71C5B1E389CD}"/>
           </ac:spMkLst>
         </pc:spChg>
+        <pc:spChg chg="add mod">
+          <ac:chgData name="Gwizdek, Marcin" userId="b5cdd603-ee13-451a-a66f-f38407a19f3f" providerId="ADAL" clId="{B358E7AF-FE73-4324-BD5A-2E65502E3E1B}" dt="2025-04-20T08:39:34.605" v="1121" actId="1076"/>
+          <ac:spMkLst>
+            <pc:docMk/>
+            <pc:sldMk cId="3436750217" sldId="257"/>
+            <ac:spMk id="2" creationId="{D9DCB745-2A2C-E810-35F5-D7790ED55E35}"/>
+          </ac:spMkLst>
+        </pc:spChg>
         <pc:spChg chg="add del mod">
           <ac:chgData name="Gwizdek, Marcin" userId="b5cdd603-ee13-451a-a66f-f38407a19f3f" providerId="ADAL" clId="{B358E7AF-FE73-4324-BD5A-2E65502E3E1B}" dt="2025-04-18T08:56:36.848" v="19"/>
           <ac:spMkLst>
             <pc:docMk/>
             <pc:sldMk cId="3436750217" sldId="257"/>
             <ac:spMk id="3" creationId="{4EB9095C-DC12-76D1-4A94-5FE086D0AA2D}"/>
+          </ac:spMkLst>
+        </pc:spChg>
+        <pc:spChg chg="add mod">
+          <ac:chgData name="Gwizdek, Marcin" userId="b5cdd603-ee13-451a-a66f-f38407a19f3f" providerId="ADAL" clId="{B358E7AF-FE73-4324-BD5A-2E65502E3E1B}" dt="2025-04-20T08:39:34.605" v="1121" actId="1076"/>
+          <ac:spMkLst>
+            <pc:docMk/>
+            <pc:sldMk cId="3436750217" sldId="257"/>
+            <ac:spMk id="3" creationId="{E1A27615-C0F6-1E2A-0242-B9060A2AD854}"/>
           </ac:spMkLst>
         </pc:spChg>
         <pc:spChg chg="mod">
@@ -163,12 +186,28 @@
             <ac:spMk id="5" creationId="{5AAB2EF3-543C-49AB-E29A-C18D223503E2}"/>
           </ac:spMkLst>
         </pc:spChg>
+        <pc:spChg chg="add mod">
+          <ac:chgData name="Gwizdek, Marcin" userId="b5cdd603-ee13-451a-a66f-f38407a19f3f" providerId="ADAL" clId="{B358E7AF-FE73-4324-BD5A-2E65502E3E1B}" dt="2025-04-20T08:39:34.605" v="1121" actId="1076"/>
+          <ac:spMkLst>
+            <pc:docMk/>
+            <pc:sldMk cId="3436750217" sldId="257"/>
+            <ac:spMk id="6" creationId="{44206087-7391-8224-E894-4B0C847E4394}"/>
+          </ac:spMkLst>
+        </pc:spChg>
         <pc:spChg chg="del">
           <ac:chgData name="Gwizdek, Marcin" userId="b5cdd603-ee13-451a-a66f-f38407a19f3f" providerId="ADAL" clId="{B358E7AF-FE73-4324-BD5A-2E65502E3E1B}" dt="2025-04-18T08:51:31.186" v="1" actId="478"/>
           <ac:spMkLst>
             <pc:docMk/>
             <pc:sldMk cId="3436750217" sldId="257"/>
             <ac:spMk id="6" creationId="{A4855690-D6F8-E49D-630A-28B023324E20}"/>
+          </ac:spMkLst>
+        </pc:spChg>
+        <pc:spChg chg="add mod">
+          <ac:chgData name="Gwizdek, Marcin" userId="b5cdd603-ee13-451a-a66f-f38407a19f3f" providerId="ADAL" clId="{B358E7AF-FE73-4324-BD5A-2E65502E3E1B}" dt="2025-04-20T08:39:34.605" v="1121" actId="1076"/>
+          <ac:spMkLst>
+            <pc:docMk/>
+            <pc:sldMk cId="3436750217" sldId="257"/>
+            <ac:spMk id="7" creationId="{B090590E-E767-1B9A-943B-011B93B8C20B}"/>
           </ac:spMkLst>
         </pc:spChg>
         <pc:spChg chg="del">
@@ -187,6 +226,14 @@
             <ac:spMk id="8" creationId="{6F86A292-0088-EA36-BF68-F5F057DA62CF}"/>
           </ac:spMkLst>
         </pc:spChg>
+        <pc:spChg chg="add mod">
+          <ac:chgData name="Gwizdek, Marcin" userId="b5cdd603-ee13-451a-a66f-f38407a19f3f" providerId="ADAL" clId="{B358E7AF-FE73-4324-BD5A-2E65502E3E1B}" dt="2025-04-20T08:39:34.605" v="1121" actId="1076"/>
+          <ac:spMkLst>
+            <pc:docMk/>
+            <pc:sldMk cId="3436750217" sldId="257"/>
+            <ac:spMk id="8" creationId="{BA69A502-75B6-675D-072D-DC23D0492534}"/>
+          </ac:spMkLst>
+        </pc:spChg>
         <pc:spChg chg="del">
           <ac:chgData name="Gwizdek, Marcin" userId="b5cdd603-ee13-451a-a66f-f38407a19f3f" providerId="ADAL" clId="{B358E7AF-FE73-4324-BD5A-2E65502E3E1B}" dt="2025-04-18T08:51:31.186" v="1" actId="478"/>
           <ac:spMkLst>
@@ -195,12 +242,36 @@
             <ac:spMk id="9" creationId="{4B596562-9AF4-31EC-B3A9-A21B21301EAC}"/>
           </ac:spMkLst>
         </pc:spChg>
+        <pc:spChg chg="add mod">
+          <ac:chgData name="Gwizdek, Marcin" userId="b5cdd603-ee13-451a-a66f-f38407a19f3f" providerId="ADAL" clId="{B358E7AF-FE73-4324-BD5A-2E65502E3E1B}" dt="2025-04-20T08:39:34.605" v="1121" actId="1076"/>
+          <ac:spMkLst>
+            <pc:docMk/>
+            <pc:sldMk cId="3436750217" sldId="257"/>
+            <ac:spMk id="9" creationId="{AD78DE3E-1D7E-1338-BECA-47138C870B67}"/>
+          </ac:spMkLst>
+        </pc:spChg>
+        <pc:spChg chg="add mod">
+          <ac:chgData name="Gwizdek, Marcin" userId="b5cdd603-ee13-451a-a66f-f38407a19f3f" providerId="ADAL" clId="{B358E7AF-FE73-4324-BD5A-2E65502E3E1B}" dt="2025-04-20T08:39:34.605" v="1121" actId="1076"/>
+          <ac:spMkLst>
+            <pc:docMk/>
+            <pc:sldMk cId="3436750217" sldId="257"/>
+            <ac:spMk id="10" creationId="{16DBB64F-FFBF-019F-D5B6-F183B533D6C6}"/>
+          </ac:spMkLst>
+        </pc:spChg>
         <pc:spChg chg="del">
           <ac:chgData name="Gwizdek, Marcin" userId="b5cdd603-ee13-451a-a66f-f38407a19f3f" providerId="ADAL" clId="{B358E7AF-FE73-4324-BD5A-2E65502E3E1B}" dt="2025-04-18T08:51:31.186" v="1" actId="478"/>
           <ac:spMkLst>
             <pc:docMk/>
             <pc:sldMk cId="3436750217" sldId="257"/>
             <ac:spMk id="10" creationId="{6D8DC2C6-23ED-B905-E379-DA32FB2F9EDC}"/>
+          </ac:spMkLst>
+        </pc:spChg>
+        <pc:spChg chg="add mod">
+          <ac:chgData name="Gwizdek, Marcin" userId="b5cdd603-ee13-451a-a66f-f38407a19f3f" providerId="ADAL" clId="{B358E7AF-FE73-4324-BD5A-2E65502E3E1B}" dt="2025-04-20T08:39:34.605" v="1121" actId="1076"/>
+          <ac:spMkLst>
+            <pc:docMk/>
+            <pc:sldMk cId="3436750217" sldId="257"/>
+            <ac:spMk id="11" creationId="{51726334-12E2-2D36-A01A-106968241435}"/>
           </ac:spMkLst>
         </pc:spChg>
         <pc:spChg chg="del">
@@ -259,6 +330,14 @@
             <ac:grpSpMk id="21" creationId="{D9BD3554-C294-EEEA-1F88-B2AEE33D12FA}"/>
           </ac:grpSpMkLst>
         </pc:grpChg>
+        <pc:picChg chg="add mod">
+          <ac:chgData name="Gwizdek, Marcin" userId="b5cdd603-ee13-451a-a66f-f38407a19f3f" providerId="ADAL" clId="{B358E7AF-FE73-4324-BD5A-2E65502E3E1B}" dt="2025-04-20T08:40:52.342" v="1136" actId="207"/>
+          <ac:picMkLst>
+            <pc:docMk/>
+            <pc:sldMk cId="3436750217" sldId="257"/>
+            <ac:picMk id="13" creationId="{5CD15896-A449-2D59-6592-DF92AD1D4515}"/>
+          </ac:picMkLst>
+        </pc:picChg>
         <pc:picChg chg="del">
           <ac:chgData name="Gwizdek, Marcin" userId="b5cdd603-ee13-451a-a66f-f38407a19f3f" providerId="ADAL" clId="{B358E7AF-FE73-4324-BD5A-2E65502E3E1B}" dt="2025-04-18T08:51:31.186" v="1" actId="478"/>
           <ac:picMkLst>
@@ -268,11 +347,27 @@
           </ac:picMkLst>
         </pc:picChg>
         <pc:picChg chg="add mod">
+          <ac:chgData name="Gwizdek, Marcin" userId="b5cdd603-ee13-451a-a66f-f38407a19f3f" providerId="ADAL" clId="{B358E7AF-FE73-4324-BD5A-2E65502E3E1B}" dt="2025-04-20T08:40:52.342" v="1136" actId="207"/>
+          <ac:picMkLst>
+            <pc:docMk/>
+            <pc:sldMk cId="3436750217" sldId="257"/>
+            <ac:picMk id="15" creationId="{564DE6C1-5545-1CFC-76A8-8D4431FBD88C}"/>
+          </ac:picMkLst>
+        </pc:picChg>
+        <pc:picChg chg="add mod">
           <ac:chgData name="Gwizdek, Marcin" userId="b5cdd603-ee13-451a-a66f-f38407a19f3f" providerId="ADAL" clId="{B358E7AF-FE73-4324-BD5A-2E65502E3E1B}" dt="2025-04-18T09:12:50.270" v="1026" actId="164"/>
           <ac:picMkLst>
             <pc:docMk/>
             <pc:sldMk cId="3436750217" sldId="257"/>
             <ac:picMk id="18" creationId="{F0C9D0F2-4CB0-6BE8-6CB0-58C36713409F}"/>
+          </ac:picMkLst>
+        </pc:picChg>
+        <pc:picChg chg="add mod">
+          <ac:chgData name="Gwizdek, Marcin" userId="b5cdd603-ee13-451a-a66f-f38407a19f3f" providerId="ADAL" clId="{B358E7AF-FE73-4324-BD5A-2E65502E3E1B}" dt="2025-04-20T08:40:52.342" v="1136" actId="207"/>
+          <ac:picMkLst>
+            <pc:docMk/>
+            <pc:sldMk cId="3436750217" sldId="257"/>
+            <ac:picMk id="19" creationId="{44D05A9C-A2C7-EFD9-B4DB-A1E5CEFB8057}"/>
           </ac:picMkLst>
         </pc:picChg>
         <pc:picChg chg="add mod">
@@ -289,6 +384,187 @@
             <pc:docMk/>
             <pc:sldMk cId="3436750217" sldId="257"/>
             <ac:picMk id="24" creationId="{6938ABEE-F404-5DE2-4F47-02BD25220C22}"/>
+          </ac:picMkLst>
+        </pc:picChg>
+        <pc:picChg chg="add mod">
+          <ac:chgData name="Gwizdek, Marcin" userId="b5cdd603-ee13-451a-a66f-f38407a19f3f" providerId="ADAL" clId="{B358E7AF-FE73-4324-BD5A-2E65502E3E1B}" dt="2025-04-20T08:40:52.342" v="1136" actId="207"/>
+          <ac:picMkLst>
+            <pc:docMk/>
+            <pc:sldMk cId="3436750217" sldId="257"/>
+            <ac:picMk id="25" creationId="{F0E4A08A-3515-3917-155E-B1B992684C5E}"/>
+          </ac:picMkLst>
+        </pc:picChg>
+      </pc:sldChg>
+      <pc:sldChg chg="add del setBg">
+        <pc:chgData name="Gwizdek, Marcin" userId="b5cdd603-ee13-451a-a66f-f38407a19f3f" providerId="ADAL" clId="{B358E7AF-FE73-4324-BD5A-2E65502E3E1B}" dt="2025-04-18T10:19:23.311" v="1106"/>
+        <pc:sldMkLst>
+          <pc:docMk/>
+          <pc:sldMk cId="245335953" sldId="258"/>
+        </pc:sldMkLst>
+      </pc:sldChg>
+      <pc:sldChg chg="delSp modSp add mod">
+        <pc:chgData name="Gwizdek, Marcin" userId="b5cdd603-ee13-451a-a66f-f38407a19f3f" providerId="ADAL" clId="{B358E7AF-FE73-4324-BD5A-2E65502E3E1B}" dt="2025-04-18T10:21:10.163" v="1109" actId="14100"/>
+        <pc:sldMkLst>
+          <pc:docMk/>
+          <pc:sldMk cId="736529973" sldId="258"/>
+        </pc:sldMkLst>
+        <pc:spChg chg="del">
+          <ac:chgData name="Gwizdek, Marcin" userId="b5cdd603-ee13-451a-a66f-f38407a19f3f" providerId="ADAL" clId="{B358E7AF-FE73-4324-BD5A-2E65502E3E1B}" dt="2025-04-18T10:19:26.246" v="1108" actId="478"/>
+          <ac:spMkLst>
+            <pc:docMk/>
+            <pc:sldMk cId="736529973" sldId="258"/>
+            <ac:spMk id="2" creationId="{D9DCB745-2A2C-E810-35F5-D7790ED55E35}"/>
+          </ac:spMkLst>
+        </pc:spChg>
+        <pc:spChg chg="del">
+          <ac:chgData name="Gwizdek, Marcin" userId="b5cdd603-ee13-451a-a66f-f38407a19f3f" providerId="ADAL" clId="{B358E7AF-FE73-4324-BD5A-2E65502E3E1B}" dt="2025-04-18T10:19:26.246" v="1108" actId="478"/>
+          <ac:spMkLst>
+            <pc:docMk/>
+            <pc:sldMk cId="736529973" sldId="258"/>
+            <ac:spMk id="3" creationId="{E1A27615-C0F6-1E2A-0242-B9060A2AD854}"/>
+          </ac:spMkLst>
+        </pc:spChg>
+        <pc:spChg chg="del">
+          <ac:chgData name="Gwizdek, Marcin" userId="b5cdd603-ee13-451a-a66f-f38407a19f3f" providerId="ADAL" clId="{B358E7AF-FE73-4324-BD5A-2E65502E3E1B}" dt="2025-04-18T10:19:26.246" v="1108" actId="478"/>
+          <ac:spMkLst>
+            <pc:docMk/>
+            <pc:sldMk cId="736529973" sldId="258"/>
+            <ac:spMk id="6" creationId="{44206087-7391-8224-E894-4B0C847E4394}"/>
+          </ac:spMkLst>
+        </pc:spChg>
+        <pc:spChg chg="del">
+          <ac:chgData name="Gwizdek, Marcin" userId="b5cdd603-ee13-451a-a66f-f38407a19f3f" providerId="ADAL" clId="{B358E7AF-FE73-4324-BD5A-2E65502E3E1B}" dt="2025-04-18T10:19:26.246" v="1108" actId="478"/>
+          <ac:spMkLst>
+            <pc:docMk/>
+            <pc:sldMk cId="736529973" sldId="258"/>
+            <ac:spMk id="7" creationId="{B090590E-E767-1B9A-943B-011B93B8C20B}"/>
+          </ac:spMkLst>
+        </pc:spChg>
+        <pc:spChg chg="del">
+          <ac:chgData name="Gwizdek, Marcin" userId="b5cdd603-ee13-451a-a66f-f38407a19f3f" providerId="ADAL" clId="{B358E7AF-FE73-4324-BD5A-2E65502E3E1B}" dt="2025-04-18T10:19:26.246" v="1108" actId="478"/>
+          <ac:spMkLst>
+            <pc:docMk/>
+            <pc:sldMk cId="736529973" sldId="258"/>
+            <ac:spMk id="8" creationId="{BA69A502-75B6-675D-072D-DC23D0492534}"/>
+          </ac:spMkLst>
+        </pc:spChg>
+        <pc:spChg chg="del">
+          <ac:chgData name="Gwizdek, Marcin" userId="b5cdd603-ee13-451a-a66f-f38407a19f3f" providerId="ADAL" clId="{B358E7AF-FE73-4324-BD5A-2E65502E3E1B}" dt="2025-04-18T10:19:26.246" v="1108" actId="478"/>
+          <ac:spMkLst>
+            <pc:docMk/>
+            <pc:sldMk cId="736529973" sldId="258"/>
+            <ac:spMk id="9" creationId="{AD78DE3E-1D7E-1338-BECA-47138C870B67}"/>
+          </ac:spMkLst>
+        </pc:spChg>
+        <pc:spChg chg="del">
+          <ac:chgData name="Gwizdek, Marcin" userId="b5cdd603-ee13-451a-a66f-f38407a19f3f" providerId="ADAL" clId="{B358E7AF-FE73-4324-BD5A-2E65502E3E1B}" dt="2025-04-18T10:19:26.246" v="1108" actId="478"/>
+          <ac:spMkLst>
+            <pc:docMk/>
+            <pc:sldMk cId="736529973" sldId="258"/>
+            <ac:spMk id="10" creationId="{16DBB64F-FFBF-019F-D5B6-F183B533D6C6}"/>
+          </ac:spMkLst>
+        </pc:spChg>
+        <pc:spChg chg="del">
+          <ac:chgData name="Gwizdek, Marcin" userId="b5cdd603-ee13-451a-a66f-f38407a19f3f" providerId="ADAL" clId="{B358E7AF-FE73-4324-BD5A-2E65502E3E1B}" dt="2025-04-18T10:19:26.246" v="1108" actId="478"/>
+          <ac:spMkLst>
+            <pc:docMk/>
+            <pc:sldMk cId="736529973" sldId="258"/>
+            <ac:spMk id="11" creationId="{51726334-12E2-2D36-A01A-106968241435}"/>
+          </ac:spMkLst>
+        </pc:spChg>
+        <pc:spChg chg="mod">
+          <ac:chgData name="Gwizdek, Marcin" userId="b5cdd603-ee13-451a-a66f-f38407a19f3f" providerId="ADAL" clId="{B358E7AF-FE73-4324-BD5A-2E65502E3E1B}" dt="2025-04-18T10:21:10.163" v="1109" actId="14100"/>
+          <ac:spMkLst>
+            <pc:docMk/>
+            <pc:sldMk cId="736529973" sldId="258"/>
+            <ac:spMk id="22" creationId="{781A4499-CAB6-0D82-BC5B-7F94519CBB57}"/>
+          </ac:spMkLst>
+        </pc:spChg>
+      </pc:sldChg>
+      <pc:sldChg chg="addSp delSp modSp new mod">
+        <pc:chgData name="Gwizdek, Marcin" userId="b5cdd603-ee13-451a-a66f-f38407a19f3f" providerId="ADAL" clId="{B358E7AF-FE73-4324-BD5A-2E65502E3E1B}" dt="2025-04-20T08:41:52.462" v="1143" actId="207"/>
+        <pc:sldMkLst>
+          <pc:docMk/>
+          <pc:sldMk cId="1646056652" sldId="259"/>
+        </pc:sldMkLst>
+        <pc:spChg chg="del">
+          <ac:chgData name="Gwizdek, Marcin" userId="b5cdd603-ee13-451a-a66f-f38407a19f3f" providerId="ADAL" clId="{B358E7AF-FE73-4324-BD5A-2E65502E3E1B}" dt="2025-04-20T08:41:35.529" v="1138" actId="478"/>
+          <ac:spMkLst>
+            <pc:docMk/>
+            <pc:sldMk cId="1646056652" sldId="259"/>
+            <ac:spMk id="2" creationId="{6283D455-0FC6-AF18-23BC-0C14B40D26BA}"/>
+          </ac:spMkLst>
+        </pc:spChg>
+        <pc:spChg chg="del">
+          <ac:chgData name="Gwizdek, Marcin" userId="b5cdd603-ee13-451a-a66f-f38407a19f3f" providerId="ADAL" clId="{B358E7AF-FE73-4324-BD5A-2E65502E3E1B}" dt="2025-04-20T08:41:37.531" v="1139" actId="478"/>
+          <ac:spMkLst>
+            <pc:docMk/>
+            <pc:sldMk cId="1646056652" sldId="259"/>
+            <ac:spMk id="3" creationId="{E0012C93-1944-6999-CA5D-F831B7CF3C7A}"/>
+          </ac:spMkLst>
+        </pc:spChg>
+        <pc:picChg chg="add mod">
+          <ac:chgData name="Gwizdek, Marcin" userId="b5cdd603-ee13-451a-a66f-f38407a19f3f" providerId="ADAL" clId="{B358E7AF-FE73-4324-BD5A-2E65502E3E1B}" dt="2025-04-20T08:41:38.895" v="1140"/>
+          <ac:picMkLst>
+            <pc:docMk/>
+            <pc:sldMk cId="1646056652" sldId="259"/>
+            <ac:picMk id="4" creationId="{AA956881-844C-A179-8530-BA09340BA9E7}"/>
+          </ac:picMkLst>
+        </pc:picChg>
+        <pc:picChg chg="add mod">
+          <ac:chgData name="Gwizdek, Marcin" userId="b5cdd603-ee13-451a-a66f-f38407a19f3f" providerId="ADAL" clId="{B358E7AF-FE73-4324-BD5A-2E65502E3E1B}" dt="2025-04-20T08:41:38.895" v="1140"/>
+          <ac:picMkLst>
+            <pc:docMk/>
+            <pc:sldMk cId="1646056652" sldId="259"/>
+            <ac:picMk id="5" creationId="{71D8B607-23B4-4B0C-C648-DA3E04FDB095}"/>
+          </ac:picMkLst>
+        </pc:picChg>
+        <pc:picChg chg="add mod">
+          <ac:chgData name="Gwizdek, Marcin" userId="b5cdd603-ee13-451a-a66f-f38407a19f3f" providerId="ADAL" clId="{B358E7AF-FE73-4324-BD5A-2E65502E3E1B}" dt="2025-04-20T08:41:38.895" v="1140"/>
+          <ac:picMkLst>
+            <pc:docMk/>
+            <pc:sldMk cId="1646056652" sldId="259"/>
+            <ac:picMk id="6" creationId="{2FDEC35A-BF00-F57D-B9E9-157ED4B8F240}"/>
+          </ac:picMkLst>
+        </pc:picChg>
+        <pc:picChg chg="add mod">
+          <ac:chgData name="Gwizdek, Marcin" userId="b5cdd603-ee13-451a-a66f-f38407a19f3f" providerId="ADAL" clId="{B358E7AF-FE73-4324-BD5A-2E65502E3E1B}" dt="2025-04-20T08:41:38.895" v="1140"/>
+          <ac:picMkLst>
+            <pc:docMk/>
+            <pc:sldMk cId="1646056652" sldId="259"/>
+            <ac:picMk id="7" creationId="{39FB9C8A-8210-E646-A726-1DD13068BAC6}"/>
+          </ac:picMkLst>
+        </pc:picChg>
+        <pc:picChg chg="add mod">
+          <ac:chgData name="Gwizdek, Marcin" userId="b5cdd603-ee13-451a-a66f-f38407a19f3f" providerId="ADAL" clId="{B358E7AF-FE73-4324-BD5A-2E65502E3E1B}" dt="2025-04-20T08:41:52.462" v="1143" actId="207"/>
+          <ac:picMkLst>
+            <pc:docMk/>
+            <pc:sldMk cId="1646056652" sldId="259"/>
+            <ac:picMk id="8" creationId="{ED2126E2-7607-DE6F-C758-A399993D6183}"/>
+          </ac:picMkLst>
+        </pc:picChg>
+        <pc:picChg chg="add mod">
+          <ac:chgData name="Gwizdek, Marcin" userId="b5cdd603-ee13-451a-a66f-f38407a19f3f" providerId="ADAL" clId="{B358E7AF-FE73-4324-BD5A-2E65502E3E1B}" dt="2025-04-20T08:41:52.462" v="1143" actId="207"/>
+          <ac:picMkLst>
+            <pc:docMk/>
+            <pc:sldMk cId="1646056652" sldId="259"/>
+            <ac:picMk id="9" creationId="{76924BAA-2E00-CB0B-043C-A0F667366404}"/>
+          </ac:picMkLst>
+        </pc:picChg>
+        <pc:picChg chg="add mod">
+          <ac:chgData name="Gwizdek, Marcin" userId="b5cdd603-ee13-451a-a66f-f38407a19f3f" providerId="ADAL" clId="{B358E7AF-FE73-4324-BD5A-2E65502E3E1B}" dt="2025-04-20T08:41:52.462" v="1143" actId="207"/>
+          <ac:picMkLst>
+            <pc:docMk/>
+            <pc:sldMk cId="1646056652" sldId="259"/>
+            <ac:picMk id="10" creationId="{DC99F8FB-578C-B7F7-7AF5-E0079162408A}"/>
+          </ac:picMkLst>
+        </pc:picChg>
+        <pc:picChg chg="add mod">
+          <ac:chgData name="Gwizdek, Marcin" userId="b5cdd603-ee13-451a-a66f-f38407a19f3f" providerId="ADAL" clId="{B358E7AF-FE73-4324-BD5A-2E65502E3E1B}" dt="2025-04-20T08:41:52.462" v="1143" actId="207"/>
+          <ac:picMkLst>
+            <pc:docMk/>
+            <pc:sldMk cId="1646056652" sldId="259"/>
+            <ac:picMk id="11" creationId="{049D9FA1-7781-8FA3-C16A-BD6BF32B25EB}"/>
           </ac:picMkLst>
         </pc:picChg>
       </pc:sldChg>
@@ -326,15 +602,15 @@
         </p:nvSpPr>
         <p:spPr>
           <a:xfrm>
-            <a:off x="1524000" y="1122363"/>
-            <a:ext cx="9144000" cy="2387600"/>
+            <a:off x="1143000" y="841772"/>
+            <a:ext cx="6858000" cy="1790700"/>
           </a:xfrm>
         </p:spPr>
         <p:txBody>
           <a:bodyPr anchor="b"/>
           <a:lstStyle>
             <a:lvl1pPr algn="ctr">
-              <a:defRPr sz="6000"/>
+              <a:defRPr sz="4500"/>
             </a:lvl1pPr>
           </a:lstStyle>
           <a:p>
@@ -358,8 +634,8 @@
         </p:nvSpPr>
         <p:spPr>
           <a:xfrm>
-            <a:off x="1524000" y="3602038"/>
-            <a:ext cx="9144000" cy="1655762"/>
+            <a:off x="1143000" y="2701528"/>
+            <a:ext cx="6858000" cy="1241822"/>
           </a:xfrm>
         </p:spPr>
         <p:txBody>
@@ -367,39 +643,39 @@
           <a:lstStyle>
             <a:lvl1pPr marL="0" indent="0" algn="ctr">
               <a:buNone/>
-              <a:defRPr sz="2400"/>
+              <a:defRPr sz="1800"/>
             </a:lvl1pPr>
-            <a:lvl2pPr marL="457200" indent="0" algn="ctr">
+            <a:lvl2pPr marL="342900" indent="0" algn="ctr">
               <a:buNone/>
-              <a:defRPr sz="2000"/>
+              <a:defRPr sz="1500"/>
             </a:lvl2pPr>
-            <a:lvl3pPr marL="914400" indent="0" algn="ctr">
+            <a:lvl3pPr marL="685800" indent="0" algn="ctr">
               <a:buNone/>
-              <a:defRPr sz="1800"/>
+              <a:defRPr sz="1350"/>
             </a:lvl3pPr>
-            <a:lvl4pPr marL="1371600" indent="0" algn="ctr">
+            <a:lvl4pPr marL="1028700" indent="0" algn="ctr">
               <a:buNone/>
-              <a:defRPr sz="1600"/>
+              <a:defRPr sz="1200"/>
             </a:lvl4pPr>
-            <a:lvl5pPr marL="1828800" indent="0" algn="ctr">
+            <a:lvl5pPr marL="1371600" indent="0" algn="ctr">
               <a:buNone/>
-              <a:defRPr sz="1600"/>
+              <a:defRPr sz="1200"/>
             </a:lvl5pPr>
-            <a:lvl6pPr marL="2286000" indent="0" algn="ctr">
+            <a:lvl6pPr marL="1714500" indent="0" algn="ctr">
               <a:buNone/>
-              <a:defRPr sz="1600"/>
+              <a:defRPr sz="1200"/>
             </a:lvl6pPr>
-            <a:lvl7pPr marL="2743200" indent="0" algn="ctr">
+            <a:lvl7pPr marL="2057400" indent="0" algn="ctr">
               <a:buNone/>
-              <a:defRPr sz="1600"/>
+              <a:defRPr sz="1200"/>
             </a:lvl7pPr>
-            <a:lvl8pPr marL="3200400" indent="0" algn="ctr">
+            <a:lvl8pPr marL="2400300" indent="0" algn="ctr">
               <a:buNone/>
-              <a:defRPr sz="1600"/>
+              <a:defRPr sz="1200"/>
             </a:lvl8pPr>
-            <a:lvl9pPr marL="3657600" indent="0" algn="ctr">
+            <a:lvl9pPr marL="2743200" indent="0" algn="ctr">
               <a:buNone/>
-              <a:defRPr sz="1600"/>
+              <a:defRPr sz="1200"/>
             </a:lvl9pPr>
           </a:lstStyle>
           <a:p>
@@ -428,7 +704,7 @@
           <a:p>
             <a:fld id="{05A87C69-6EAC-45D8-9E77-85B45FDE7099}" type="datetimeFigureOut">
               <a:rPr lang="en-US" smtClean="0"/>
-              <a:t>4/18/2025</a:t>
+              <a:t>4/20/2025</a:t>
             </a:fld>
             <a:endParaRPr lang="en-US"/>
           </a:p>
@@ -479,7 +755,7 @@
     </p:spTree>
     <p:extLst>
       <p:ext uri="{BB962C8B-B14F-4D97-AF65-F5344CB8AC3E}">
-        <p14:creationId xmlns:p14="http://schemas.microsoft.com/office/powerpoint/2010/main" val="2629280212"/>
+        <p14:creationId xmlns:p14="http://schemas.microsoft.com/office/powerpoint/2010/main" val="3469173470"/>
       </p:ext>
     </p:extLst>
   </p:cSld>
@@ -598,7 +874,7 @@
           <a:p>
             <a:fld id="{05A87C69-6EAC-45D8-9E77-85B45FDE7099}" type="datetimeFigureOut">
               <a:rPr lang="en-US" smtClean="0"/>
-              <a:t>4/18/2025</a:t>
+              <a:t>4/20/2025</a:t>
             </a:fld>
             <a:endParaRPr lang="en-US"/>
           </a:p>
@@ -649,7 +925,7 @@
     </p:spTree>
     <p:extLst>
       <p:ext uri="{BB962C8B-B14F-4D97-AF65-F5344CB8AC3E}">
-        <p14:creationId xmlns:p14="http://schemas.microsoft.com/office/powerpoint/2010/main" val="2620258179"/>
+        <p14:creationId xmlns:p14="http://schemas.microsoft.com/office/powerpoint/2010/main" val="3429216286"/>
       </p:ext>
     </p:extLst>
   </p:cSld>
@@ -688,8 +964,8 @@
         </p:nvSpPr>
         <p:spPr>
           <a:xfrm>
-            <a:off x="8724900" y="365125"/>
-            <a:ext cx="2628900" cy="5811838"/>
+            <a:off x="6543675" y="273844"/>
+            <a:ext cx="1971675" cy="4358879"/>
           </a:xfrm>
         </p:spPr>
         <p:txBody>
@@ -716,8 +992,8 @@
         </p:nvSpPr>
         <p:spPr>
           <a:xfrm>
-            <a:off x="838200" y="365125"/>
-            <a:ext cx="7734300" cy="5811838"/>
+            <a:off x="628650" y="273844"/>
+            <a:ext cx="5800725" cy="4358879"/>
           </a:xfrm>
         </p:spPr>
         <p:txBody>
@@ -778,7 +1054,7 @@
           <a:p>
             <a:fld id="{05A87C69-6EAC-45D8-9E77-85B45FDE7099}" type="datetimeFigureOut">
               <a:rPr lang="en-US" smtClean="0"/>
-              <a:t>4/18/2025</a:t>
+              <a:t>4/20/2025</a:t>
             </a:fld>
             <a:endParaRPr lang="en-US"/>
           </a:p>
@@ -829,7 +1105,7 @@
     </p:spTree>
     <p:extLst>
       <p:ext uri="{BB962C8B-B14F-4D97-AF65-F5344CB8AC3E}">
-        <p14:creationId xmlns:p14="http://schemas.microsoft.com/office/powerpoint/2010/main" val="819099898"/>
+        <p14:creationId xmlns:p14="http://schemas.microsoft.com/office/powerpoint/2010/main" val="819363715"/>
       </p:ext>
     </p:extLst>
   </p:cSld>
@@ -948,7 +1224,7 @@
           <a:p>
             <a:fld id="{05A87C69-6EAC-45D8-9E77-85B45FDE7099}" type="datetimeFigureOut">
               <a:rPr lang="en-US" smtClean="0"/>
-              <a:t>4/18/2025</a:t>
+              <a:t>4/20/2025</a:t>
             </a:fld>
             <a:endParaRPr lang="en-US"/>
           </a:p>
@@ -999,7 +1275,7 @@
     </p:spTree>
     <p:extLst>
       <p:ext uri="{BB962C8B-B14F-4D97-AF65-F5344CB8AC3E}">
-        <p14:creationId xmlns:p14="http://schemas.microsoft.com/office/powerpoint/2010/main" val="3060888319"/>
+        <p14:creationId xmlns:p14="http://schemas.microsoft.com/office/powerpoint/2010/main" val="3666570081"/>
       </p:ext>
     </p:extLst>
   </p:cSld>
@@ -1038,15 +1314,15 @@
         </p:nvSpPr>
         <p:spPr>
           <a:xfrm>
-            <a:off x="831850" y="1709738"/>
-            <a:ext cx="10515600" cy="2852737"/>
+            <a:off x="623888" y="1282304"/>
+            <a:ext cx="7886700" cy="2139553"/>
           </a:xfrm>
         </p:spPr>
         <p:txBody>
           <a:bodyPr anchor="b"/>
           <a:lstStyle>
             <a:lvl1pPr>
-              <a:defRPr sz="6000"/>
+              <a:defRPr sz="4500"/>
             </a:lvl1pPr>
           </a:lstStyle>
           <a:p>
@@ -1070,34 +1346,14 @@
         </p:nvSpPr>
         <p:spPr>
           <a:xfrm>
-            <a:off x="831850" y="4589463"/>
-            <a:ext cx="10515600" cy="1500187"/>
+            <a:off x="623888" y="3442098"/>
+            <a:ext cx="7886700" cy="1125140"/>
           </a:xfrm>
         </p:spPr>
         <p:txBody>
           <a:bodyPr/>
           <a:lstStyle>
             <a:lvl1pPr marL="0" indent="0">
-              <a:buNone/>
-              <a:defRPr sz="2400">
-                <a:solidFill>
-                  <a:schemeClr val="tx1">
-                    <a:tint val="75000"/>
-                  </a:schemeClr>
-                </a:solidFill>
-              </a:defRPr>
-            </a:lvl1pPr>
-            <a:lvl2pPr marL="457200" indent="0">
-              <a:buNone/>
-              <a:defRPr sz="2000">
-                <a:solidFill>
-                  <a:schemeClr val="tx1">
-                    <a:tint val="75000"/>
-                  </a:schemeClr>
-                </a:solidFill>
-              </a:defRPr>
-            </a:lvl2pPr>
-            <a:lvl3pPr marL="914400" indent="0">
               <a:buNone/>
               <a:defRPr sz="1800">
                 <a:solidFill>
@@ -1106,10 +1362,30 @@
                   </a:schemeClr>
                 </a:solidFill>
               </a:defRPr>
+            </a:lvl1pPr>
+            <a:lvl2pPr marL="342900" indent="0">
+              <a:buNone/>
+              <a:defRPr sz="1500">
+                <a:solidFill>
+                  <a:schemeClr val="tx1">
+                    <a:tint val="75000"/>
+                  </a:schemeClr>
+                </a:solidFill>
+              </a:defRPr>
+            </a:lvl2pPr>
+            <a:lvl3pPr marL="685800" indent="0">
+              <a:buNone/>
+              <a:defRPr sz="1350">
+                <a:solidFill>
+                  <a:schemeClr val="tx1">
+                    <a:tint val="75000"/>
+                  </a:schemeClr>
+                </a:solidFill>
+              </a:defRPr>
             </a:lvl3pPr>
-            <a:lvl4pPr marL="1371600" indent="0">
+            <a:lvl4pPr marL="1028700" indent="0">
               <a:buNone/>
-              <a:defRPr sz="1600">
+              <a:defRPr sz="1200">
                 <a:solidFill>
                   <a:schemeClr val="tx1">
                     <a:tint val="75000"/>
@@ -1117,9 +1393,9 @@
                 </a:solidFill>
               </a:defRPr>
             </a:lvl4pPr>
-            <a:lvl5pPr marL="1828800" indent="0">
+            <a:lvl5pPr marL="1371600" indent="0">
               <a:buNone/>
-              <a:defRPr sz="1600">
+              <a:defRPr sz="1200">
                 <a:solidFill>
                   <a:schemeClr val="tx1">
                     <a:tint val="75000"/>
@@ -1127,9 +1403,9 @@
                 </a:solidFill>
               </a:defRPr>
             </a:lvl5pPr>
-            <a:lvl6pPr marL="2286000" indent="0">
+            <a:lvl6pPr marL="1714500" indent="0">
               <a:buNone/>
-              <a:defRPr sz="1600">
+              <a:defRPr sz="1200">
                 <a:solidFill>
                   <a:schemeClr val="tx1">
                     <a:tint val="75000"/>
@@ -1137,9 +1413,9 @@
                 </a:solidFill>
               </a:defRPr>
             </a:lvl6pPr>
-            <a:lvl7pPr marL="2743200" indent="0">
+            <a:lvl7pPr marL="2057400" indent="0">
               <a:buNone/>
-              <a:defRPr sz="1600">
+              <a:defRPr sz="1200">
                 <a:solidFill>
                   <a:schemeClr val="tx1">
                     <a:tint val="75000"/>
@@ -1147,9 +1423,9 @@
                 </a:solidFill>
               </a:defRPr>
             </a:lvl7pPr>
-            <a:lvl8pPr marL="3200400" indent="0">
+            <a:lvl8pPr marL="2400300" indent="0">
               <a:buNone/>
-              <a:defRPr sz="1600">
+              <a:defRPr sz="1200">
                 <a:solidFill>
                   <a:schemeClr val="tx1">
                     <a:tint val="75000"/>
@@ -1157,9 +1433,9 @@
                 </a:solidFill>
               </a:defRPr>
             </a:lvl8pPr>
-            <a:lvl9pPr marL="3657600" indent="0">
+            <a:lvl9pPr marL="2743200" indent="0">
               <a:buNone/>
-              <a:defRPr sz="1600">
+              <a:defRPr sz="1200">
                 <a:solidFill>
                   <a:schemeClr val="tx1">
                     <a:tint val="75000"/>
@@ -1194,7 +1470,7 @@
           <a:p>
             <a:fld id="{05A87C69-6EAC-45D8-9E77-85B45FDE7099}" type="datetimeFigureOut">
               <a:rPr lang="en-US" smtClean="0"/>
-              <a:t>4/18/2025</a:t>
+              <a:t>4/20/2025</a:t>
             </a:fld>
             <a:endParaRPr lang="en-US"/>
           </a:p>
@@ -1245,7 +1521,7 @@
     </p:spTree>
     <p:extLst>
       <p:ext uri="{BB962C8B-B14F-4D97-AF65-F5344CB8AC3E}">
-        <p14:creationId xmlns:p14="http://schemas.microsoft.com/office/powerpoint/2010/main" val="806242740"/>
+        <p14:creationId xmlns:p14="http://schemas.microsoft.com/office/powerpoint/2010/main" val="3083901952"/>
       </p:ext>
     </p:extLst>
   </p:cSld>
@@ -1307,8 +1583,8 @@
         </p:nvSpPr>
         <p:spPr>
           <a:xfrm>
-            <a:off x="838200" y="1825625"/>
-            <a:ext cx="5181600" cy="4351338"/>
+            <a:off x="628650" y="1369219"/>
+            <a:ext cx="3886200" cy="3263504"/>
           </a:xfrm>
         </p:spPr>
         <p:txBody>
@@ -1364,8 +1640,8 @@
         </p:nvSpPr>
         <p:spPr>
           <a:xfrm>
-            <a:off x="6172200" y="1825625"/>
-            <a:ext cx="5181600" cy="4351338"/>
+            <a:off x="4629150" y="1369219"/>
+            <a:ext cx="3886200" cy="3263504"/>
           </a:xfrm>
         </p:spPr>
         <p:txBody>
@@ -1426,7 +1702,7 @@
           <a:p>
             <a:fld id="{05A87C69-6EAC-45D8-9E77-85B45FDE7099}" type="datetimeFigureOut">
               <a:rPr lang="en-US" smtClean="0"/>
-              <a:t>4/18/2025</a:t>
+              <a:t>4/20/2025</a:t>
             </a:fld>
             <a:endParaRPr lang="en-US"/>
           </a:p>
@@ -1477,7 +1753,7 @@
     </p:spTree>
     <p:extLst>
       <p:ext uri="{BB962C8B-B14F-4D97-AF65-F5344CB8AC3E}">
-        <p14:creationId xmlns:p14="http://schemas.microsoft.com/office/powerpoint/2010/main" val="2272606924"/>
+        <p14:creationId xmlns:p14="http://schemas.microsoft.com/office/powerpoint/2010/main" val="2321612939"/>
       </p:ext>
     </p:extLst>
   </p:cSld>
@@ -1516,8 +1792,8 @@
         </p:nvSpPr>
         <p:spPr>
           <a:xfrm>
-            <a:off x="839788" y="365125"/>
-            <a:ext cx="10515600" cy="1325563"/>
+            <a:off x="629841" y="273844"/>
+            <a:ext cx="7886700" cy="994172"/>
           </a:xfrm>
         </p:spPr>
         <p:txBody>
@@ -1544,8 +1820,8 @@
         </p:nvSpPr>
         <p:spPr>
           <a:xfrm>
-            <a:off x="839788" y="1681163"/>
-            <a:ext cx="5157787" cy="823912"/>
+            <a:off x="629842" y="1260872"/>
+            <a:ext cx="3868340" cy="617934"/>
           </a:xfrm>
         </p:spPr>
         <p:txBody>
@@ -1553,39 +1829,39 @@
           <a:lstStyle>
             <a:lvl1pPr marL="0" indent="0">
               <a:buNone/>
-              <a:defRPr sz="2400" b="1"/>
+              <a:defRPr sz="1800" b="1"/>
             </a:lvl1pPr>
-            <a:lvl2pPr marL="457200" indent="0">
+            <a:lvl2pPr marL="342900" indent="0">
               <a:buNone/>
-              <a:defRPr sz="2000" b="1"/>
+              <a:defRPr sz="1500" b="1"/>
             </a:lvl2pPr>
-            <a:lvl3pPr marL="914400" indent="0">
+            <a:lvl3pPr marL="685800" indent="0">
               <a:buNone/>
-              <a:defRPr sz="1800" b="1"/>
+              <a:defRPr sz="1350" b="1"/>
             </a:lvl3pPr>
-            <a:lvl4pPr marL="1371600" indent="0">
+            <a:lvl4pPr marL="1028700" indent="0">
               <a:buNone/>
-              <a:defRPr sz="1600" b="1"/>
+              <a:defRPr sz="1200" b="1"/>
             </a:lvl4pPr>
-            <a:lvl5pPr marL="1828800" indent="0">
+            <a:lvl5pPr marL="1371600" indent="0">
               <a:buNone/>
-              <a:defRPr sz="1600" b="1"/>
+              <a:defRPr sz="1200" b="1"/>
             </a:lvl5pPr>
-            <a:lvl6pPr marL="2286000" indent="0">
+            <a:lvl6pPr marL="1714500" indent="0">
               <a:buNone/>
-              <a:defRPr sz="1600" b="1"/>
+              <a:defRPr sz="1200" b="1"/>
             </a:lvl6pPr>
-            <a:lvl7pPr marL="2743200" indent="0">
+            <a:lvl7pPr marL="2057400" indent="0">
               <a:buNone/>
-              <a:defRPr sz="1600" b="1"/>
+              <a:defRPr sz="1200" b="1"/>
             </a:lvl7pPr>
-            <a:lvl8pPr marL="3200400" indent="0">
+            <a:lvl8pPr marL="2400300" indent="0">
               <a:buNone/>
-              <a:defRPr sz="1600" b="1"/>
+              <a:defRPr sz="1200" b="1"/>
             </a:lvl8pPr>
-            <a:lvl9pPr marL="3657600" indent="0">
+            <a:lvl9pPr marL="2743200" indent="0">
               <a:buNone/>
-              <a:defRPr sz="1600" b="1"/>
+              <a:defRPr sz="1200" b="1"/>
             </a:lvl9pPr>
           </a:lstStyle>
           <a:p>
@@ -1609,8 +1885,8 @@
         </p:nvSpPr>
         <p:spPr>
           <a:xfrm>
-            <a:off x="839788" y="2505075"/>
-            <a:ext cx="5157787" cy="3684588"/>
+            <a:off x="629842" y="1878806"/>
+            <a:ext cx="3868340" cy="2763441"/>
           </a:xfrm>
         </p:spPr>
         <p:txBody>
@@ -1666,8 +1942,8 @@
         </p:nvSpPr>
         <p:spPr>
           <a:xfrm>
-            <a:off x="6172200" y="1681163"/>
-            <a:ext cx="5183188" cy="823912"/>
+            <a:off x="4629150" y="1260872"/>
+            <a:ext cx="3887391" cy="617934"/>
           </a:xfrm>
         </p:spPr>
         <p:txBody>
@@ -1675,39 +1951,39 @@
           <a:lstStyle>
             <a:lvl1pPr marL="0" indent="0">
               <a:buNone/>
-              <a:defRPr sz="2400" b="1"/>
+              <a:defRPr sz="1800" b="1"/>
             </a:lvl1pPr>
-            <a:lvl2pPr marL="457200" indent="0">
+            <a:lvl2pPr marL="342900" indent="0">
               <a:buNone/>
-              <a:defRPr sz="2000" b="1"/>
+              <a:defRPr sz="1500" b="1"/>
             </a:lvl2pPr>
-            <a:lvl3pPr marL="914400" indent="0">
+            <a:lvl3pPr marL="685800" indent="0">
               <a:buNone/>
-              <a:defRPr sz="1800" b="1"/>
+              <a:defRPr sz="1350" b="1"/>
             </a:lvl3pPr>
-            <a:lvl4pPr marL="1371600" indent="0">
+            <a:lvl4pPr marL="1028700" indent="0">
               <a:buNone/>
-              <a:defRPr sz="1600" b="1"/>
+              <a:defRPr sz="1200" b="1"/>
             </a:lvl4pPr>
-            <a:lvl5pPr marL="1828800" indent="0">
+            <a:lvl5pPr marL="1371600" indent="0">
               <a:buNone/>
-              <a:defRPr sz="1600" b="1"/>
+              <a:defRPr sz="1200" b="1"/>
             </a:lvl5pPr>
-            <a:lvl6pPr marL="2286000" indent="0">
+            <a:lvl6pPr marL="1714500" indent="0">
               <a:buNone/>
-              <a:defRPr sz="1600" b="1"/>
+              <a:defRPr sz="1200" b="1"/>
             </a:lvl6pPr>
-            <a:lvl7pPr marL="2743200" indent="0">
+            <a:lvl7pPr marL="2057400" indent="0">
               <a:buNone/>
-              <a:defRPr sz="1600" b="1"/>
+              <a:defRPr sz="1200" b="1"/>
             </a:lvl7pPr>
-            <a:lvl8pPr marL="3200400" indent="0">
+            <a:lvl8pPr marL="2400300" indent="0">
               <a:buNone/>
-              <a:defRPr sz="1600" b="1"/>
+              <a:defRPr sz="1200" b="1"/>
             </a:lvl8pPr>
-            <a:lvl9pPr marL="3657600" indent="0">
+            <a:lvl9pPr marL="2743200" indent="0">
               <a:buNone/>
-              <a:defRPr sz="1600" b="1"/>
+              <a:defRPr sz="1200" b="1"/>
             </a:lvl9pPr>
           </a:lstStyle>
           <a:p>
@@ -1731,8 +2007,8 @@
         </p:nvSpPr>
         <p:spPr>
           <a:xfrm>
-            <a:off x="6172200" y="2505075"/>
-            <a:ext cx="5183188" cy="3684588"/>
+            <a:off x="4629150" y="1878806"/>
+            <a:ext cx="3887391" cy="2763441"/>
           </a:xfrm>
         </p:spPr>
         <p:txBody>
@@ -1793,7 +2069,7 @@
           <a:p>
             <a:fld id="{05A87C69-6EAC-45D8-9E77-85B45FDE7099}" type="datetimeFigureOut">
               <a:rPr lang="en-US" smtClean="0"/>
-              <a:t>4/18/2025</a:t>
+              <a:t>4/20/2025</a:t>
             </a:fld>
             <a:endParaRPr lang="en-US"/>
           </a:p>
@@ -1844,7 +2120,7 @@
     </p:spTree>
     <p:extLst>
       <p:ext uri="{BB962C8B-B14F-4D97-AF65-F5344CB8AC3E}">
-        <p14:creationId xmlns:p14="http://schemas.microsoft.com/office/powerpoint/2010/main" val="4278146329"/>
+        <p14:creationId xmlns:p14="http://schemas.microsoft.com/office/powerpoint/2010/main" val="2097855099"/>
       </p:ext>
     </p:extLst>
   </p:cSld>
@@ -1911,7 +2187,7 @@
           <a:p>
             <a:fld id="{05A87C69-6EAC-45D8-9E77-85B45FDE7099}" type="datetimeFigureOut">
               <a:rPr lang="en-US" smtClean="0"/>
-              <a:t>4/18/2025</a:t>
+              <a:t>4/20/2025</a:t>
             </a:fld>
             <a:endParaRPr lang="en-US"/>
           </a:p>
@@ -1962,7 +2238,7 @@
     </p:spTree>
     <p:extLst>
       <p:ext uri="{BB962C8B-B14F-4D97-AF65-F5344CB8AC3E}">
-        <p14:creationId xmlns:p14="http://schemas.microsoft.com/office/powerpoint/2010/main" val="2825963674"/>
+        <p14:creationId xmlns:p14="http://schemas.microsoft.com/office/powerpoint/2010/main" val="413406958"/>
       </p:ext>
     </p:extLst>
   </p:cSld>
@@ -2006,7 +2282,7 @@
           <a:p>
             <a:fld id="{05A87C69-6EAC-45D8-9E77-85B45FDE7099}" type="datetimeFigureOut">
               <a:rPr lang="en-US" smtClean="0"/>
-              <a:t>4/18/2025</a:t>
+              <a:t>4/20/2025</a:t>
             </a:fld>
             <a:endParaRPr lang="en-US"/>
           </a:p>
@@ -2057,7 +2333,7 @@
     </p:spTree>
     <p:extLst>
       <p:ext uri="{BB962C8B-B14F-4D97-AF65-F5344CB8AC3E}">
-        <p14:creationId xmlns:p14="http://schemas.microsoft.com/office/powerpoint/2010/main" val="3460601940"/>
+        <p14:creationId xmlns:p14="http://schemas.microsoft.com/office/powerpoint/2010/main" val="397537542"/>
       </p:ext>
     </p:extLst>
   </p:cSld>
@@ -2096,15 +2372,15 @@
         </p:nvSpPr>
         <p:spPr>
           <a:xfrm>
-            <a:off x="839788" y="457200"/>
-            <a:ext cx="3932237" cy="1600200"/>
+            <a:off x="629841" y="342900"/>
+            <a:ext cx="2949178" cy="1200150"/>
           </a:xfrm>
         </p:spPr>
         <p:txBody>
           <a:bodyPr anchor="b"/>
           <a:lstStyle>
             <a:lvl1pPr>
-              <a:defRPr sz="3200"/>
+              <a:defRPr sz="2400"/>
             </a:lvl1pPr>
           </a:lstStyle>
           <a:p>
@@ -2128,39 +2404,39 @@
         </p:nvSpPr>
         <p:spPr>
           <a:xfrm>
-            <a:off x="5183188" y="987425"/>
-            <a:ext cx="6172200" cy="4873625"/>
+            <a:off x="3887391" y="740569"/>
+            <a:ext cx="4629150" cy="3655219"/>
           </a:xfrm>
         </p:spPr>
         <p:txBody>
           <a:bodyPr/>
           <a:lstStyle>
             <a:lvl1pPr>
-              <a:defRPr sz="3200"/>
+              <a:defRPr sz="2400"/>
             </a:lvl1pPr>
             <a:lvl2pPr>
-              <a:defRPr sz="2800"/>
+              <a:defRPr sz="2100"/>
             </a:lvl2pPr>
             <a:lvl3pPr>
-              <a:defRPr sz="2400"/>
+              <a:defRPr sz="1800"/>
             </a:lvl3pPr>
             <a:lvl4pPr>
-              <a:defRPr sz="2000"/>
+              <a:defRPr sz="1500"/>
             </a:lvl4pPr>
             <a:lvl5pPr>
-              <a:defRPr sz="2000"/>
+              <a:defRPr sz="1500"/>
             </a:lvl5pPr>
             <a:lvl6pPr>
-              <a:defRPr sz="2000"/>
+              <a:defRPr sz="1500"/>
             </a:lvl6pPr>
             <a:lvl7pPr>
-              <a:defRPr sz="2000"/>
+              <a:defRPr sz="1500"/>
             </a:lvl7pPr>
             <a:lvl8pPr>
-              <a:defRPr sz="2000"/>
+              <a:defRPr sz="1500"/>
             </a:lvl8pPr>
             <a:lvl9pPr>
-              <a:defRPr sz="2000"/>
+              <a:defRPr sz="1500"/>
             </a:lvl9pPr>
           </a:lstStyle>
           <a:p>
@@ -2213,8 +2489,8 @@
         </p:nvSpPr>
         <p:spPr>
           <a:xfrm>
-            <a:off x="839788" y="2057400"/>
-            <a:ext cx="3932237" cy="3811588"/>
+            <a:off x="629841" y="1543050"/>
+            <a:ext cx="2949178" cy="2858691"/>
           </a:xfrm>
         </p:spPr>
         <p:txBody>
@@ -2222,39 +2498,39 @@
           <a:lstStyle>
             <a:lvl1pPr marL="0" indent="0">
               <a:buNone/>
-              <a:defRPr sz="1600"/>
+              <a:defRPr sz="1200"/>
             </a:lvl1pPr>
-            <a:lvl2pPr marL="457200" indent="0">
+            <a:lvl2pPr marL="342900" indent="0">
               <a:buNone/>
-              <a:defRPr sz="1400"/>
+              <a:defRPr sz="1050"/>
             </a:lvl2pPr>
-            <a:lvl3pPr marL="914400" indent="0">
+            <a:lvl3pPr marL="685800" indent="0">
               <a:buNone/>
-              <a:defRPr sz="1200"/>
+              <a:defRPr sz="900"/>
             </a:lvl3pPr>
-            <a:lvl4pPr marL="1371600" indent="0">
+            <a:lvl4pPr marL="1028700" indent="0">
               <a:buNone/>
-              <a:defRPr sz="1000"/>
+              <a:defRPr sz="750"/>
             </a:lvl4pPr>
-            <a:lvl5pPr marL="1828800" indent="0">
+            <a:lvl5pPr marL="1371600" indent="0">
               <a:buNone/>
-              <a:defRPr sz="1000"/>
+              <a:defRPr sz="750"/>
             </a:lvl5pPr>
-            <a:lvl6pPr marL="2286000" indent="0">
+            <a:lvl6pPr marL="1714500" indent="0">
               <a:buNone/>
-              <a:defRPr sz="1000"/>
+              <a:defRPr sz="750"/>
             </a:lvl6pPr>
-            <a:lvl7pPr marL="2743200" indent="0">
+            <a:lvl7pPr marL="2057400" indent="0">
               <a:buNone/>
-              <a:defRPr sz="1000"/>
+              <a:defRPr sz="750"/>
             </a:lvl7pPr>
-            <a:lvl8pPr marL="3200400" indent="0">
+            <a:lvl8pPr marL="2400300" indent="0">
               <a:buNone/>
-              <a:defRPr sz="1000"/>
+              <a:defRPr sz="750"/>
             </a:lvl8pPr>
-            <a:lvl9pPr marL="3657600" indent="0">
+            <a:lvl9pPr marL="2743200" indent="0">
               <a:buNone/>
-              <a:defRPr sz="1000"/>
+              <a:defRPr sz="750"/>
             </a:lvl9pPr>
           </a:lstStyle>
           <a:p>
@@ -2283,7 +2559,7 @@
           <a:p>
             <a:fld id="{05A87C69-6EAC-45D8-9E77-85B45FDE7099}" type="datetimeFigureOut">
               <a:rPr lang="en-US" smtClean="0"/>
-              <a:t>4/18/2025</a:t>
+              <a:t>4/20/2025</a:t>
             </a:fld>
             <a:endParaRPr lang="en-US"/>
           </a:p>
@@ -2334,7 +2610,7 @@
     </p:spTree>
     <p:extLst>
       <p:ext uri="{BB962C8B-B14F-4D97-AF65-F5344CB8AC3E}">
-        <p14:creationId xmlns:p14="http://schemas.microsoft.com/office/powerpoint/2010/main" val="3224953286"/>
+        <p14:creationId xmlns:p14="http://schemas.microsoft.com/office/powerpoint/2010/main" val="3422497224"/>
       </p:ext>
     </p:extLst>
   </p:cSld>
@@ -2373,15 +2649,15 @@
         </p:nvSpPr>
         <p:spPr>
           <a:xfrm>
-            <a:off x="839788" y="457200"/>
-            <a:ext cx="3932237" cy="1600200"/>
+            <a:off x="629841" y="342900"/>
+            <a:ext cx="2949178" cy="1200150"/>
           </a:xfrm>
         </p:spPr>
         <p:txBody>
           <a:bodyPr anchor="b"/>
           <a:lstStyle>
             <a:lvl1pPr>
-              <a:defRPr sz="3200"/>
+              <a:defRPr sz="2400"/>
             </a:lvl1pPr>
           </a:lstStyle>
           <a:p>
@@ -2405,8 +2681,8 @@
         </p:nvSpPr>
         <p:spPr>
           <a:xfrm>
-            <a:off x="5183188" y="987425"/>
-            <a:ext cx="6172200" cy="4873625"/>
+            <a:off x="3887391" y="740569"/>
+            <a:ext cx="4629150" cy="3655219"/>
           </a:xfrm>
         </p:spPr>
         <p:txBody>
@@ -2414,39 +2690,39 @@
           <a:lstStyle>
             <a:lvl1pPr marL="0" indent="0">
               <a:buNone/>
-              <a:defRPr sz="3200"/>
+              <a:defRPr sz="2400"/>
             </a:lvl1pPr>
-            <a:lvl2pPr marL="457200" indent="0">
+            <a:lvl2pPr marL="342900" indent="0">
               <a:buNone/>
-              <a:defRPr sz="2800"/>
+              <a:defRPr sz="2100"/>
             </a:lvl2pPr>
-            <a:lvl3pPr marL="914400" indent="0">
+            <a:lvl3pPr marL="685800" indent="0">
               <a:buNone/>
-              <a:defRPr sz="2400"/>
+              <a:defRPr sz="1800"/>
             </a:lvl3pPr>
-            <a:lvl4pPr marL="1371600" indent="0">
+            <a:lvl4pPr marL="1028700" indent="0">
               <a:buNone/>
-              <a:defRPr sz="2000"/>
+              <a:defRPr sz="1500"/>
             </a:lvl4pPr>
-            <a:lvl5pPr marL="1828800" indent="0">
+            <a:lvl5pPr marL="1371600" indent="0">
               <a:buNone/>
-              <a:defRPr sz="2000"/>
+              <a:defRPr sz="1500"/>
             </a:lvl5pPr>
-            <a:lvl6pPr marL="2286000" indent="0">
+            <a:lvl6pPr marL="1714500" indent="0">
               <a:buNone/>
-              <a:defRPr sz="2000"/>
+              <a:defRPr sz="1500"/>
             </a:lvl6pPr>
-            <a:lvl7pPr marL="2743200" indent="0">
+            <a:lvl7pPr marL="2057400" indent="0">
               <a:buNone/>
-              <a:defRPr sz="2000"/>
+              <a:defRPr sz="1500"/>
             </a:lvl7pPr>
-            <a:lvl8pPr marL="3200400" indent="0">
+            <a:lvl8pPr marL="2400300" indent="0">
               <a:buNone/>
-              <a:defRPr sz="2000"/>
+              <a:defRPr sz="1500"/>
             </a:lvl8pPr>
-            <a:lvl9pPr marL="3657600" indent="0">
+            <a:lvl9pPr marL="2743200" indent="0">
               <a:buNone/>
-              <a:defRPr sz="2000"/>
+              <a:defRPr sz="1500"/>
             </a:lvl9pPr>
           </a:lstStyle>
           <a:p>
@@ -2470,8 +2746,8 @@
         </p:nvSpPr>
         <p:spPr>
           <a:xfrm>
-            <a:off x="839788" y="2057400"/>
-            <a:ext cx="3932237" cy="3811588"/>
+            <a:off x="629841" y="1543050"/>
+            <a:ext cx="2949178" cy="2858691"/>
           </a:xfrm>
         </p:spPr>
         <p:txBody>
@@ -2479,39 +2755,39 @@
           <a:lstStyle>
             <a:lvl1pPr marL="0" indent="0">
               <a:buNone/>
-              <a:defRPr sz="1600"/>
+              <a:defRPr sz="1200"/>
             </a:lvl1pPr>
-            <a:lvl2pPr marL="457200" indent="0">
+            <a:lvl2pPr marL="342900" indent="0">
               <a:buNone/>
-              <a:defRPr sz="1400"/>
+              <a:defRPr sz="1050"/>
             </a:lvl2pPr>
-            <a:lvl3pPr marL="914400" indent="0">
+            <a:lvl3pPr marL="685800" indent="0">
               <a:buNone/>
-              <a:defRPr sz="1200"/>
+              <a:defRPr sz="900"/>
             </a:lvl3pPr>
-            <a:lvl4pPr marL="1371600" indent="0">
+            <a:lvl4pPr marL="1028700" indent="0">
               <a:buNone/>
-              <a:defRPr sz="1000"/>
+              <a:defRPr sz="750"/>
             </a:lvl4pPr>
-            <a:lvl5pPr marL="1828800" indent="0">
+            <a:lvl5pPr marL="1371600" indent="0">
               <a:buNone/>
-              <a:defRPr sz="1000"/>
+              <a:defRPr sz="750"/>
             </a:lvl5pPr>
-            <a:lvl6pPr marL="2286000" indent="0">
+            <a:lvl6pPr marL="1714500" indent="0">
               <a:buNone/>
-              <a:defRPr sz="1000"/>
+              <a:defRPr sz="750"/>
             </a:lvl6pPr>
-            <a:lvl7pPr marL="2743200" indent="0">
+            <a:lvl7pPr marL="2057400" indent="0">
               <a:buNone/>
-              <a:defRPr sz="1000"/>
+              <a:defRPr sz="750"/>
             </a:lvl7pPr>
-            <a:lvl8pPr marL="3200400" indent="0">
+            <a:lvl8pPr marL="2400300" indent="0">
               <a:buNone/>
-              <a:defRPr sz="1000"/>
+              <a:defRPr sz="750"/>
             </a:lvl8pPr>
-            <a:lvl9pPr marL="3657600" indent="0">
+            <a:lvl9pPr marL="2743200" indent="0">
               <a:buNone/>
-              <a:defRPr sz="1000"/>
+              <a:defRPr sz="750"/>
             </a:lvl9pPr>
           </a:lstStyle>
           <a:p>
@@ -2540,7 +2816,7 @@
           <a:p>
             <a:fld id="{05A87C69-6EAC-45D8-9E77-85B45FDE7099}" type="datetimeFigureOut">
               <a:rPr lang="en-US" smtClean="0"/>
-              <a:t>4/18/2025</a:t>
+              <a:t>4/20/2025</a:t>
             </a:fld>
             <a:endParaRPr lang="en-US"/>
           </a:p>
@@ -2591,7 +2867,7 @@
     </p:spTree>
     <p:extLst>
       <p:ext uri="{BB962C8B-B14F-4D97-AF65-F5344CB8AC3E}">
-        <p14:creationId xmlns:p14="http://schemas.microsoft.com/office/powerpoint/2010/main" val="2119512902"/>
+        <p14:creationId xmlns:p14="http://schemas.microsoft.com/office/powerpoint/2010/main" val="3224720368"/>
       </p:ext>
     </p:extLst>
   </p:cSld>
@@ -2635,8 +2911,8 @@
         </p:nvSpPr>
         <p:spPr>
           <a:xfrm>
-            <a:off x="838200" y="365125"/>
-            <a:ext cx="10515600" cy="1325563"/>
+            <a:off x="628650" y="273844"/>
+            <a:ext cx="7886700" cy="994172"/>
           </a:xfrm>
           <a:prstGeom prst="rect">
             <a:avLst/>
@@ -2668,8 +2944,8 @@
         </p:nvSpPr>
         <p:spPr>
           <a:xfrm>
-            <a:off x="838200" y="1825625"/>
-            <a:ext cx="10515600" cy="4351338"/>
+            <a:off x="628650" y="1369219"/>
+            <a:ext cx="7886700" cy="3263504"/>
           </a:xfrm>
           <a:prstGeom prst="rect">
             <a:avLst/>
@@ -2730,8 +3006,8 @@
         </p:nvSpPr>
         <p:spPr>
           <a:xfrm>
-            <a:off x="838200" y="6356350"/>
-            <a:ext cx="2743200" cy="365125"/>
+            <a:off x="628650" y="4767263"/>
+            <a:ext cx="2057400" cy="273844"/>
           </a:xfrm>
           <a:prstGeom prst="rect">
             <a:avLst/>
@@ -2741,7 +3017,7 @@
           <a:bodyPr vert="horz" lIns="91440" tIns="45720" rIns="91440" bIns="45720" rtlCol="0" anchor="ctr"/>
           <a:lstStyle>
             <a:lvl1pPr algn="l">
-              <a:defRPr sz="1200">
+              <a:defRPr sz="900">
                 <a:solidFill>
                   <a:schemeClr val="tx1">
                     <a:tint val="75000"/>
@@ -2753,7 +3029,7 @@
           <a:p>
             <a:fld id="{05A87C69-6EAC-45D8-9E77-85B45FDE7099}" type="datetimeFigureOut">
               <a:rPr lang="en-US" smtClean="0"/>
-              <a:t>4/18/2025</a:t>
+              <a:t>4/20/2025</a:t>
             </a:fld>
             <a:endParaRPr lang="en-US"/>
           </a:p>
@@ -2771,8 +3047,8 @@
         </p:nvSpPr>
         <p:spPr>
           <a:xfrm>
-            <a:off x="4038600" y="6356350"/>
-            <a:ext cx="4114800" cy="365125"/>
+            <a:off x="3028950" y="4767263"/>
+            <a:ext cx="3086100" cy="273844"/>
           </a:xfrm>
           <a:prstGeom prst="rect">
             <a:avLst/>
@@ -2782,7 +3058,7 @@
           <a:bodyPr vert="horz" lIns="91440" tIns="45720" rIns="91440" bIns="45720" rtlCol="0" anchor="ctr"/>
           <a:lstStyle>
             <a:lvl1pPr algn="ctr">
-              <a:defRPr sz="1200">
+              <a:defRPr sz="900">
                 <a:solidFill>
                   <a:schemeClr val="tx1">
                     <a:tint val="75000"/>
@@ -2808,8 +3084,8 @@
         </p:nvSpPr>
         <p:spPr>
           <a:xfrm>
-            <a:off x="8610600" y="6356350"/>
-            <a:ext cx="2743200" cy="365125"/>
+            <a:off x="6457950" y="4767263"/>
+            <a:ext cx="2057400" cy="273844"/>
           </a:xfrm>
           <a:prstGeom prst="rect">
             <a:avLst/>
@@ -2819,7 +3095,7 @@
           <a:bodyPr vert="horz" lIns="91440" tIns="45720" rIns="91440" bIns="45720" rtlCol="0" anchor="ctr"/>
           <a:lstStyle>
             <a:lvl1pPr algn="r">
-              <a:defRPr sz="1200">
+              <a:defRPr sz="900">
                 <a:solidFill>
                   <a:schemeClr val="tx1">
                     <a:tint val="75000"/>
@@ -2839,10 +3115,10 @@
       </p:sp>
       <p:sp>
         <p:nvSpPr>
-          <p:cNvPr id="8" name="TextBox 7">
+          <p:cNvPr id="7" name="TextBox 6">
             <a:extLst>
               <a:ext uri="{FF2B5EF4-FFF2-40B4-BE49-F238E27FC236}">
-                <a16:creationId xmlns:a16="http://schemas.microsoft.com/office/drawing/2014/main" id="{8D4BB05E-4BD6-650A-38EE-30DCAC522C44}"/>
+                <a16:creationId xmlns:a16="http://schemas.microsoft.com/office/drawing/2014/main" id="{7AB2531D-BBFF-2BF3-E2FD-E09E4AC4D6F7}"/>
               </a:ext>
             </a:extLst>
           </p:cNvPr>
@@ -2857,8 +3133,8 @@
         </p:nvSpPr>
         <p:spPr>
           <a:xfrm>
-            <a:off x="5938012" y="6687820"/>
-            <a:ext cx="341313" cy="106680"/>
+            <a:off x="4453509" y="5015866"/>
+            <a:ext cx="255985" cy="80791"/>
           </a:xfrm>
           <a:prstGeom prst="rect">
             <a:avLst/>
@@ -2872,7 +3148,7 @@
           <a:p>
             <a:pPr algn="l"/>
             <a:r>
-              <a:rPr lang="en-US" sz="700">
+              <a:rPr lang="en-US" sz="525">
                 <a:solidFill>
                   <a:srgbClr val="7F7F7F"/>
                 </a:solidFill>
@@ -2887,27 +3163,27 @@
     </p:spTree>
     <p:extLst>
       <p:ext uri="{BB962C8B-B14F-4D97-AF65-F5344CB8AC3E}">
-        <p14:creationId xmlns:p14="http://schemas.microsoft.com/office/powerpoint/2010/main" val="3241468497"/>
+        <p14:creationId xmlns:p14="http://schemas.microsoft.com/office/powerpoint/2010/main" val="527347570"/>
       </p:ext>
     </p:extLst>
   </p:cSld>
   <p:clrMap bg1="lt1" tx1="dk1" bg2="lt2" tx2="dk2" accent1="accent1" accent2="accent2" accent3="accent3" accent4="accent4" accent5="accent5" accent6="accent6" hlink="hlink" folHlink="folHlink"/>
   <p:sldLayoutIdLst>
-    <p:sldLayoutId id="2147483679" r:id="rId1"/>
-    <p:sldLayoutId id="2147483680" r:id="rId2"/>
-    <p:sldLayoutId id="2147483681" r:id="rId3"/>
-    <p:sldLayoutId id="2147483682" r:id="rId4"/>
-    <p:sldLayoutId id="2147483683" r:id="rId5"/>
-    <p:sldLayoutId id="2147483684" r:id="rId6"/>
-    <p:sldLayoutId id="2147483685" r:id="rId7"/>
-    <p:sldLayoutId id="2147483686" r:id="rId8"/>
-    <p:sldLayoutId id="2147483687" r:id="rId9"/>
-    <p:sldLayoutId id="2147483688" r:id="rId10"/>
-    <p:sldLayoutId id="2147483689" r:id="rId11"/>
+    <p:sldLayoutId id="2147483691" r:id="rId1"/>
+    <p:sldLayoutId id="2147483692" r:id="rId2"/>
+    <p:sldLayoutId id="2147483693" r:id="rId3"/>
+    <p:sldLayoutId id="2147483694" r:id="rId4"/>
+    <p:sldLayoutId id="2147483695" r:id="rId5"/>
+    <p:sldLayoutId id="2147483696" r:id="rId6"/>
+    <p:sldLayoutId id="2147483697" r:id="rId7"/>
+    <p:sldLayoutId id="2147483698" r:id="rId8"/>
+    <p:sldLayoutId id="2147483699" r:id="rId9"/>
+    <p:sldLayoutId id="2147483700" r:id="rId10"/>
+    <p:sldLayoutId id="2147483701" r:id="rId11"/>
   </p:sldLayoutIdLst>
   <p:txStyles>
     <p:titleStyle>
-      <a:lvl1pPr algn="l" defTabSz="914400" rtl="0" eaLnBrk="1" latinLnBrk="0" hangingPunct="1">
+      <a:lvl1pPr algn="l" defTabSz="685800" rtl="0" eaLnBrk="1" latinLnBrk="0" hangingPunct="1">
         <a:lnSpc>
           <a:spcPct val="90000"/>
         </a:lnSpc>
@@ -2915,7 +3191,7 @@
           <a:spcPct val="0"/>
         </a:spcBef>
         <a:buNone/>
-        <a:defRPr sz="4400" kern="1200">
+        <a:defRPr sz="3300" kern="1200">
           <a:solidFill>
             <a:schemeClr val="tx1"/>
           </a:solidFill>
@@ -2926,16 +3202,16 @@
       </a:lvl1pPr>
     </p:titleStyle>
     <p:bodyStyle>
-      <a:lvl1pPr marL="228600" indent="-228600" algn="l" defTabSz="914400" rtl="0" eaLnBrk="1" latinLnBrk="0" hangingPunct="1">
+      <a:lvl1pPr marL="171450" indent="-171450" algn="l" defTabSz="685800" rtl="0" eaLnBrk="1" latinLnBrk="0" hangingPunct="1">
         <a:lnSpc>
           <a:spcPct val="90000"/>
         </a:lnSpc>
         <a:spcBef>
-          <a:spcPts val="1000"/>
+          <a:spcPts val="750"/>
         </a:spcBef>
         <a:buFont typeface="Arial" panose="020B0604020202020204" pitchFamily="34" charset="0"/>
         <a:buChar char="•"/>
-        <a:defRPr sz="2800" kern="1200">
+        <a:defRPr sz="2100" kern="1200">
           <a:solidFill>
             <a:schemeClr val="tx1"/>
           </a:solidFill>
@@ -2944,48 +3220,12 @@
           <a:cs typeface="+mn-cs"/>
         </a:defRPr>
       </a:lvl1pPr>
-      <a:lvl2pPr marL="685800" indent="-228600" algn="l" defTabSz="914400" rtl="0" eaLnBrk="1" latinLnBrk="0" hangingPunct="1">
+      <a:lvl2pPr marL="514350" indent="-171450" algn="l" defTabSz="685800" rtl="0" eaLnBrk="1" latinLnBrk="0" hangingPunct="1">
         <a:lnSpc>
           <a:spcPct val="90000"/>
         </a:lnSpc>
         <a:spcBef>
-          <a:spcPts val="500"/>
-        </a:spcBef>
-        <a:buFont typeface="Arial" panose="020B0604020202020204" pitchFamily="34" charset="0"/>
-        <a:buChar char="•"/>
-        <a:defRPr sz="2400" kern="1200">
-          <a:solidFill>
-            <a:schemeClr val="tx1"/>
-          </a:solidFill>
-          <a:latin typeface="+mn-lt"/>
-          <a:ea typeface="+mn-ea"/>
-          <a:cs typeface="+mn-cs"/>
-        </a:defRPr>
-      </a:lvl2pPr>
-      <a:lvl3pPr marL="1143000" indent="-228600" algn="l" defTabSz="914400" rtl="0" eaLnBrk="1" latinLnBrk="0" hangingPunct="1">
-        <a:lnSpc>
-          <a:spcPct val="90000"/>
-        </a:lnSpc>
-        <a:spcBef>
-          <a:spcPts val="500"/>
-        </a:spcBef>
-        <a:buFont typeface="Arial" panose="020B0604020202020204" pitchFamily="34" charset="0"/>
-        <a:buChar char="•"/>
-        <a:defRPr sz="2000" kern="1200">
-          <a:solidFill>
-            <a:schemeClr val="tx1"/>
-          </a:solidFill>
-          <a:latin typeface="+mn-lt"/>
-          <a:ea typeface="+mn-ea"/>
-          <a:cs typeface="+mn-cs"/>
-        </a:defRPr>
-      </a:lvl3pPr>
-      <a:lvl4pPr marL="1600200" indent="-228600" algn="l" defTabSz="914400" rtl="0" eaLnBrk="1" latinLnBrk="0" hangingPunct="1">
-        <a:lnSpc>
-          <a:spcPct val="90000"/>
-        </a:lnSpc>
-        <a:spcBef>
-          <a:spcPts val="500"/>
+          <a:spcPts val="375"/>
         </a:spcBef>
         <a:buFont typeface="Arial" panose="020B0604020202020204" pitchFamily="34" charset="0"/>
         <a:buChar char="•"/>
@@ -2997,17 +3237,53 @@
           <a:ea typeface="+mn-ea"/>
           <a:cs typeface="+mn-cs"/>
         </a:defRPr>
-      </a:lvl4pPr>
-      <a:lvl5pPr marL="2057400" indent="-228600" algn="l" defTabSz="914400" rtl="0" eaLnBrk="1" latinLnBrk="0" hangingPunct="1">
+      </a:lvl2pPr>
+      <a:lvl3pPr marL="857250" indent="-171450" algn="l" defTabSz="685800" rtl="0" eaLnBrk="1" latinLnBrk="0" hangingPunct="1">
         <a:lnSpc>
           <a:spcPct val="90000"/>
         </a:lnSpc>
         <a:spcBef>
-          <a:spcPts val="500"/>
+          <a:spcPts val="375"/>
         </a:spcBef>
         <a:buFont typeface="Arial" panose="020B0604020202020204" pitchFamily="34" charset="0"/>
         <a:buChar char="•"/>
-        <a:defRPr sz="1800" kern="1200">
+        <a:defRPr sz="1500" kern="1200">
+          <a:solidFill>
+            <a:schemeClr val="tx1"/>
+          </a:solidFill>
+          <a:latin typeface="+mn-lt"/>
+          <a:ea typeface="+mn-ea"/>
+          <a:cs typeface="+mn-cs"/>
+        </a:defRPr>
+      </a:lvl3pPr>
+      <a:lvl4pPr marL="1200150" indent="-171450" algn="l" defTabSz="685800" rtl="0" eaLnBrk="1" latinLnBrk="0" hangingPunct="1">
+        <a:lnSpc>
+          <a:spcPct val="90000"/>
+        </a:lnSpc>
+        <a:spcBef>
+          <a:spcPts val="375"/>
+        </a:spcBef>
+        <a:buFont typeface="Arial" panose="020B0604020202020204" pitchFamily="34" charset="0"/>
+        <a:buChar char="•"/>
+        <a:defRPr sz="1350" kern="1200">
+          <a:solidFill>
+            <a:schemeClr val="tx1"/>
+          </a:solidFill>
+          <a:latin typeface="+mn-lt"/>
+          <a:ea typeface="+mn-ea"/>
+          <a:cs typeface="+mn-cs"/>
+        </a:defRPr>
+      </a:lvl4pPr>
+      <a:lvl5pPr marL="1543050" indent="-171450" algn="l" defTabSz="685800" rtl="0" eaLnBrk="1" latinLnBrk="0" hangingPunct="1">
+        <a:lnSpc>
+          <a:spcPct val="90000"/>
+        </a:lnSpc>
+        <a:spcBef>
+          <a:spcPts val="375"/>
+        </a:spcBef>
+        <a:buFont typeface="Arial" panose="020B0604020202020204" pitchFamily="34" charset="0"/>
+        <a:buChar char="•"/>
+        <a:defRPr sz="1350" kern="1200">
           <a:solidFill>
             <a:schemeClr val="tx1"/>
           </a:solidFill>
@@ -3016,16 +3292,16 @@
           <a:cs typeface="+mn-cs"/>
         </a:defRPr>
       </a:lvl5pPr>
-      <a:lvl6pPr marL="2514600" indent="-228600" algn="l" defTabSz="914400" rtl="0" eaLnBrk="1" latinLnBrk="0" hangingPunct="1">
+      <a:lvl6pPr marL="1885950" indent="-171450" algn="l" defTabSz="685800" rtl="0" eaLnBrk="1" latinLnBrk="0" hangingPunct="1">
         <a:lnSpc>
           <a:spcPct val="90000"/>
         </a:lnSpc>
         <a:spcBef>
-          <a:spcPts val="500"/>
+          <a:spcPts val="375"/>
         </a:spcBef>
         <a:buFont typeface="Arial" panose="020B0604020202020204" pitchFamily="34" charset="0"/>
         <a:buChar char="•"/>
-        <a:defRPr sz="1800" kern="1200">
+        <a:defRPr sz="1350" kern="1200">
           <a:solidFill>
             <a:schemeClr val="tx1"/>
           </a:solidFill>
@@ -3034,16 +3310,16 @@
           <a:cs typeface="+mn-cs"/>
         </a:defRPr>
       </a:lvl6pPr>
-      <a:lvl7pPr marL="2971800" indent="-228600" algn="l" defTabSz="914400" rtl="0" eaLnBrk="1" latinLnBrk="0" hangingPunct="1">
+      <a:lvl7pPr marL="2228850" indent="-171450" algn="l" defTabSz="685800" rtl="0" eaLnBrk="1" latinLnBrk="0" hangingPunct="1">
         <a:lnSpc>
           <a:spcPct val="90000"/>
         </a:lnSpc>
         <a:spcBef>
-          <a:spcPts val="500"/>
+          <a:spcPts val="375"/>
         </a:spcBef>
         <a:buFont typeface="Arial" panose="020B0604020202020204" pitchFamily="34" charset="0"/>
         <a:buChar char="•"/>
-        <a:defRPr sz="1800" kern="1200">
+        <a:defRPr sz="1350" kern="1200">
           <a:solidFill>
             <a:schemeClr val="tx1"/>
           </a:solidFill>
@@ -3052,16 +3328,16 @@
           <a:cs typeface="+mn-cs"/>
         </a:defRPr>
       </a:lvl7pPr>
-      <a:lvl8pPr marL="3429000" indent="-228600" algn="l" defTabSz="914400" rtl="0" eaLnBrk="1" latinLnBrk="0" hangingPunct="1">
+      <a:lvl8pPr marL="2571750" indent="-171450" algn="l" defTabSz="685800" rtl="0" eaLnBrk="1" latinLnBrk="0" hangingPunct="1">
         <a:lnSpc>
           <a:spcPct val="90000"/>
         </a:lnSpc>
         <a:spcBef>
-          <a:spcPts val="500"/>
+          <a:spcPts val="375"/>
         </a:spcBef>
         <a:buFont typeface="Arial" panose="020B0604020202020204" pitchFamily="34" charset="0"/>
         <a:buChar char="•"/>
-        <a:defRPr sz="1800" kern="1200">
+        <a:defRPr sz="1350" kern="1200">
           <a:solidFill>
             <a:schemeClr val="tx1"/>
           </a:solidFill>
@@ -3070,16 +3346,16 @@
           <a:cs typeface="+mn-cs"/>
         </a:defRPr>
       </a:lvl8pPr>
-      <a:lvl9pPr marL="3886200" indent="-228600" algn="l" defTabSz="914400" rtl="0" eaLnBrk="1" latinLnBrk="0" hangingPunct="1">
+      <a:lvl9pPr marL="2914650" indent="-171450" algn="l" defTabSz="685800" rtl="0" eaLnBrk="1" latinLnBrk="0" hangingPunct="1">
         <a:lnSpc>
           <a:spcPct val="90000"/>
         </a:lnSpc>
         <a:spcBef>
-          <a:spcPts val="500"/>
+          <a:spcPts val="375"/>
         </a:spcBef>
         <a:buFont typeface="Arial" panose="020B0604020202020204" pitchFamily="34" charset="0"/>
         <a:buChar char="•"/>
-        <a:defRPr sz="1800" kern="1200">
+        <a:defRPr sz="1350" kern="1200">
           <a:solidFill>
             <a:schemeClr val="tx1"/>
           </a:solidFill>
@@ -3093,8 +3369,8 @@
       <a:defPPr>
         <a:defRPr lang="en-US"/>
       </a:defPPr>
-      <a:lvl1pPr marL="0" algn="l" defTabSz="914400" rtl="0" eaLnBrk="1" latinLnBrk="0" hangingPunct="1">
-        <a:defRPr sz="1800" kern="1200">
+      <a:lvl1pPr marL="0" algn="l" defTabSz="685800" rtl="0" eaLnBrk="1" latinLnBrk="0" hangingPunct="1">
+        <a:defRPr sz="1350" kern="1200">
           <a:solidFill>
             <a:schemeClr val="tx1"/>
           </a:solidFill>
@@ -3103,8 +3379,8 @@
           <a:cs typeface="+mn-cs"/>
         </a:defRPr>
       </a:lvl1pPr>
-      <a:lvl2pPr marL="457200" algn="l" defTabSz="914400" rtl="0" eaLnBrk="1" latinLnBrk="0" hangingPunct="1">
-        <a:defRPr sz="1800" kern="1200">
+      <a:lvl2pPr marL="342900" algn="l" defTabSz="685800" rtl="0" eaLnBrk="1" latinLnBrk="0" hangingPunct="1">
+        <a:defRPr sz="1350" kern="1200">
           <a:solidFill>
             <a:schemeClr val="tx1"/>
           </a:solidFill>
@@ -3113,8 +3389,8 @@
           <a:cs typeface="+mn-cs"/>
         </a:defRPr>
       </a:lvl2pPr>
-      <a:lvl3pPr marL="914400" algn="l" defTabSz="914400" rtl="0" eaLnBrk="1" latinLnBrk="0" hangingPunct="1">
-        <a:defRPr sz="1800" kern="1200">
+      <a:lvl3pPr marL="685800" algn="l" defTabSz="685800" rtl="0" eaLnBrk="1" latinLnBrk="0" hangingPunct="1">
+        <a:defRPr sz="1350" kern="1200">
           <a:solidFill>
             <a:schemeClr val="tx1"/>
           </a:solidFill>
@@ -3123,8 +3399,8 @@
           <a:cs typeface="+mn-cs"/>
         </a:defRPr>
       </a:lvl3pPr>
-      <a:lvl4pPr marL="1371600" algn="l" defTabSz="914400" rtl="0" eaLnBrk="1" latinLnBrk="0" hangingPunct="1">
-        <a:defRPr sz="1800" kern="1200">
+      <a:lvl4pPr marL="1028700" algn="l" defTabSz="685800" rtl="0" eaLnBrk="1" latinLnBrk="0" hangingPunct="1">
+        <a:defRPr sz="1350" kern="1200">
           <a:solidFill>
             <a:schemeClr val="tx1"/>
           </a:solidFill>
@@ -3133,8 +3409,8 @@
           <a:cs typeface="+mn-cs"/>
         </a:defRPr>
       </a:lvl4pPr>
-      <a:lvl5pPr marL="1828800" algn="l" defTabSz="914400" rtl="0" eaLnBrk="1" latinLnBrk="0" hangingPunct="1">
-        <a:defRPr sz="1800" kern="1200">
+      <a:lvl5pPr marL="1371600" algn="l" defTabSz="685800" rtl="0" eaLnBrk="1" latinLnBrk="0" hangingPunct="1">
+        <a:defRPr sz="1350" kern="1200">
           <a:solidFill>
             <a:schemeClr val="tx1"/>
           </a:solidFill>
@@ -3143,8 +3419,8 @@
           <a:cs typeface="+mn-cs"/>
         </a:defRPr>
       </a:lvl5pPr>
-      <a:lvl6pPr marL="2286000" algn="l" defTabSz="914400" rtl="0" eaLnBrk="1" latinLnBrk="0" hangingPunct="1">
-        <a:defRPr sz="1800" kern="1200">
+      <a:lvl6pPr marL="1714500" algn="l" defTabSz="685800" rtl="0" eaLnBrk="1" latinLnBrk="0" hangingPunct="1">
+        <a:defRPr sz="1350" kern="1200">
           <a:solidFill>
             <a:schemeClr val="tx1"/>
           </a:solidFill>
@@ -3153,8 +3429,8 @@
           <a:cs typeface="+mn-cs"/>
         </a:defRPr>
       </a:lvl6pPr>
-      <a:lvl7pPr marL="2743200" algn="l" defTabSz="914400" rtl="0" eaLnBrk="1" latinLnBrk="0" hangingPunct="1">
-        <a:defRPr sz="1800" kern="1200">
+      <a:lvl7pPr marL="2057400" algn="l" defTabSz="685800" rtl="0" eaLnBrk="1" latinLnBrk="0" hangingPunct="1">
+        <a:defRPr sz="1350" kern="1200">
           <a:solidFill>
             <a:schemeClr val="tx1"/>
           </a:solidFill>
@@ -3163,8 +3439,8 @@
           <a:cs typeface="+mn-cs"/>
         </a:defRPr>
       </a:lvl7pPr>
-      <a:lvl8pPr marL="3200400" algn="l" defTabSz="914400" rtl="0" eaLnBrk="1" latinLnBrk="0" hangingPunct="1">
-        <a:defRPr sz="1800" kern="1200">
+      <a:lvl8pPr marL="2400300" algn="l" defTabSz="685800" rtl="0" eaLnBrk="1" latinLnBrk="0" hangingPunct="1">
+        <a:defRPr sz="1350" kern="1200">
           <a:solidFill>
             <a:schemeClr val="tx1"/>
           </a:solidFill>
@@ -3173,8 +3449,8 @@
           <a:cs typeface="+mn-cs"/>
         </a:defRPr>
       </a:lvl8pPr>
-      <a:lvl9pPr marL="3657600" algn="l" defTabSz="914400" rtl="0" eaLnBrk="1" latinLnBrk="0" hangingPunct="1">
-        <a:defRPr sz="1800" kern="1200">
+      <a:lvl9pPr marL="2743200" algn="l" defTabSz="685800" rtl="0" eaLnBrk="1" latinLnBrk="0" hangingPunct="1">
+        <a:defRPr sz="1350" kern="1200">
           <a:solidFill>
             <a:schemeClr val="tx1"/>
           </a:solidFill>
@@ -3219,8 +3495,8 @@
         </p:nvSpPr>
         <p:spPr>
           <a:xfrm>
-            <a:off x="782877" y="739036"/>
-            <a:ext cx="895611" cy="707720"/>
+            <a:off x="587158" y="554277"/>
+            <a:ext cx="671708" cy="530790"/>
           </a:xfrm>
           <a:prstGeom prst="rect">
             <a:avLst/>
@@ -3247,7 +3523,7 @@
           <a:lstStyle/>
           <a:p>
             <a:pPr algn="ctr"/>
-            <a:endParaRPr lang="en-US"/>
+            <a:endParaRPr lang="en-US" sz="1013"/>
           </a:p>
         </p:txBody>
       </p:sp>
@@ -3265,8 +3541,8 @@
         </p:nvSpPr>
         <p:spPr>
           <a:xfrm>
-            <a:off x="1821493" y="739036"/>
-            <a:ext cx="895611" cy="707720"/>
+            <a:off x="1366120" y="554277"/>
+            <a:ext cx="671708" cy="530790"/>
           </a:xfrm>
           <a:prstGeom prst="rect">
             <a:avLst/>
@@ -3293,7 +3569,7 @@
           <a:lstStyle/>
           <a:p>
             <a:pPr algn="ctr"/>
-            <a:endParaRPr lang="en-US"/>
+            <a:endParaRPr lang="en-US" sz="1013"/>
           </a:p>
         </p:txBody>
       </p:sp>
@@ -3311,8 +3587,8 @@
         </p:nvSpPr>
         <p:spPr>
           <a:xfrm>
-            <a:off x="2860109" y="739036"/>
-            <a:ext cx="895611" cy="707720"/>
+            <a:off x="2145082" y="554277"/>
+            <a:ext cx="671708" cy="530790"/>
           </a:xfrm>
           <a:prstGeom prst="rect">
             <a:avLst/>
@@ -3339,7 +3615,7 @@
           <a:lstStyle/>
           <a:p>
             <a:pPr algn="ctr"/>
-            <a:endParaRPr lang="en-US"/>
+            <a:endParaRPr lang="en-US" sz="1013"/>
           </a:p>
         </p:txBody>
       </p:sp>
@@ -3357,8 +3633,8 @@
         </p:nvSpPr>
         <p:spPr>
           <a:xfrm>
-            <a:off x="3898725" y="739036"/>
-            <a:ext cx="895611" cy="707720"/>
+            <a:off x="2924044" y="554277"/>
+            <a:ext cx="671708" cy="530790"/>
           </a:xfrm>
           <a:prstGeom prst="rect">
             <a:avLst/>
@@ -3385,7 +3661,7 @@
           <a:lstStyle/>
           <a:p>
             <a:pPr algn="ctr"/>
-            <a:endParaRPr lang="en-US"/>
+            <a:endParaRPr lang="en-US" sz="1013"/>
           </a:p>
         </p:txBody>
       </p:sp>
@@ -3403,8 +3679,8 @@
         </p:nvSpPr>
         <p:spPr>
           <a:xfrm>
-            <a:off x="4937341" y="739036"/>
-            <a:ext cx="895611" cy="707720"/>
+            <a:off x="3703006" y="554277"/>
+            <a:ext cx="671708" cy="530790"/>
           </a:xfrm>
           <a:prstGeom prst="rect">
             <a:avLst/>
@@ -3431,7 +3707,7 @@
           <a:lstStyle/>
           <a:p>
             <a:pPr algn="ctr"/>
-            <a:endParaRPr lang="en-US"/>
+            <a:endParaRPr lang="en-US" sz="1013"/>
           </a:p>
         </p:txBody>
       </p:sp>
@@ -3449,8 +3725,8 @@
         </p:nvSpPr>
         <p:spPr>
           <a:xfrm>
-            <a:off x="5975959" y="739036"/>
-            <a:ext cx="895611" cy="707720"/>
+            <a:off x="4481970" y="554277"/>
+            <a:ext cx="671708" cy="530790"/>
           </a:xfrm>
           <a:prstGeom prst="rect">
             <a:avLst/>
@@ -3477,7 +3753,7 @@
           <a:lstStyle/>
           <a:p>
             <a:pPr algn="ctr"/>
-            <a:endParaRPr lang="en-US"/>
+            <a:endParaRPr lang="en-US" sz="1013"/>
           </a:p>
         </p:txBody>
       </p:sp>
@@ -3509,8 +3785,8 @@
         </p:blipFill>
         <p:spPr>
           <a:xfrm>
-            <a:off x="6216521" y="2617941"/>
-            <a:ext cx="3591559" cy="2398734"/>
+            <a:off x="4662391" y="1963456"/>
+            <a:ext cx="2693669" cy="1799051"/>
           </a:xfrm>
           <a:prstGeom prst="rect">
             <a:avLst/>
@@ -3531,8 +3807,8 @@
         </p:nvSpPr>
         <p:spPr>
           <a:xfrm>
-            <a:off x="5267195" y="2721280"/>
-            <a:ext cx="895611" cy="707720"/>
+            <a:off x="3950397" y="2040960"/>
+            <a:ext cx="671708" cy="530790"/>
           </a:xfrm>
           <a:prstGeom prst="rect">
             <a:avLst/>
@@ -3566,7 +3842,7 @@
           <a:lstStyle/>
           <a:p>
             <a:pPr algn="ctr"/>
-            <a:endParaRPr lang="en-US"/>
+            <a:endParaRPr lang="en-US" sz="1013"/>
           </a:p>
         </p:txBody>
       </p:sp>
@@ -3584,8 +3860,8 @@
         </p:nvSpPr>
         <p:spPr>
           <a:xfrm>
-            <a:off x="5267194" y="3605409"/>
-            <a:ext cx="895611" cy="707720"/>
+            <a:off x="3950396" y="2704057"/>
+            <a:ext cx="671708" cy="530790"/>
           </a:xfrm>
           <a:prstGeom prst="rect">
             <a:avLst/>
@@ -3615,7 +3891,7 @@
           <a:lstStyle/>
           <a:p>
             <a:pPr algn="ctr"/>
-            <a:endParaRPr lang="en-US"/>
+            <a:endParaRPr lang="en-US" sz="1013"/>
           </a:p>
         </p:txBody>
       </p:sp>
@@ -3671,8 +3947,8 @@
         </p:nvSpPr>
         <p:spPr>
           <a:xfrm>
-            <a:off x="1" y="0"/>
-            <a:ext cx="12191999" cy="532263"/>
+            <a:off x="1" y="1"/>
+            <a:ext cx="9143999" cy="399197"/>
           </a:xfrm>
           <a:custGeom>
             <a:avLst/>
@@ -3808,7 +4084,7 @@
           <a:lstStyle/>
           <a:p>
             <a:pPr algn="ctr"/>
-            <a:endParaRPr lang="en-US"/>
+            <a:endParaRPr lang="en-US" sz="1013"/>
           </a:p>
         </p:txBody>
       </p:sp>
@@ -3826,8 +4102,8 @@
         </p:nvSpPr>
         <p:spPr>
           <a:xfrm flipH="1" flipV="1">
-            <a:off x="0" y="6516806"/>
-            <a:ext cx="12192000" cy="341194"/>
+            <a:off x="0" y="4887604"/>
+            <a:ext cx="9144000" cy="255896"/>
           </a:xfrm>
           <a:custGeom>
             <a:avLst/>
@@ -3965,7 +4241,7 @@
           <a:lstStyle/>
           <a:p>
             <a:pPr algn="ctr"/>
-            <a:endParaRPr lang="en-US"/>
+            <a:endParaRPr lang="en-US" sz="1013"/>
           </a:p>
         </p:txBody>
       </p:sp>
@@ -3983,8 +4259,8 @@
         </p:nvSpPr>
         <p:spPr>
           <a:xfrm>
-            <a:off x="9485196" y="183450"/>
-            <a:ext cx="2210938" cy="348813"/>
+            <a:off x="7113897" y="137588"/>
+            <a:ext cx="1658204" cy="297517"/>
           </a:xfrm>
           <a:prstGeom prst="rect">
             <a:avLst/>
@@ -3999,11 +4275,11 @@
           <a:p>
             <a:pPr>
               <a:lnSpc>
-                <a:spcPts val="1000"/>
+                <a:spcPts val="750"/>
               </a:lnSpc>
             </a:pPr>
             <a:r>
-              <a:rPr lang="en-US" sz="2000" dirty="0">
+              <a:rPr lang="en-US" sz="1500" dirty="0">
                 <a:solidFill>
                   <a:schemeClr val="accent1"/>
                 </a:solidFill>
@@ -4013,7 +4289,7 @@
               <a:t>MG </a:t>
             </a:r>
             <a:r>
-              <a:rPr lang="en-US" sz="2000" dirty="0">
+              <a:rPr lang="en-US" sz="1500" dirty="0">
                 <a:solidFill>
                   <a:srgbClr val="E0144C"/>
                 </a:solidFill>
@@ -4023,7 +4299,7 @@
               <a:t>ANALYTICS</a:t>
             </a:r>
             <a:br>
-              <a:rPr lang="en-US" sz="2400" spc="300" dirty="0">
+              <a:rPr lang="en-US" sz="1800" spc="225" dirty="0">
                 <a:solidFill>
                   <a:srgbClr val="E0144C"/>
                 </a:solidFill>
@@ -4032,7 +4308,7 @@
               </a:rPr>
             </a:br>
             <a:r>
-              <a:rPr lang="en-US" sz="1000" dirty="0">
+              <a:rPr lang="en-US" sz="750" dirty="0">
                 <a:gradFill flip="none" rotWithShape="1">
                   <a:gsLst>
                     <a:gs pos="0">
@@ -4051,7 +4327,7 @@
               </a:rPr>
               <a:t>AUSTIN REAL ESTATE INSIGHTS</a:t>
             </a:r>
-            <a:endParaRPr lang="en-US" sz="1000" dirty="0">
+            <a:endParaRPr lang="en-US" sz="750" dirty="0">
               <a:gradFill flip="none" rotWithShape="1">
                 <a:gsLst>
                   <a:gs pos="0">
@@ -4084,8 +4360,8 @@
         </p:nvGrpSpPr>
         <p:grpSpPr>
           <a:xfrm>
-            <a:off x="11418629" y="7677"/>
-            <a:ext cx="673287" cy="469995"/>
+            <a:off x="8563972" y="5758"/>
+            <a:ext cx="504965" cy="352496"/>
             <a:chOff x="5181600" y="1236829"/>
             <a:chExt cx="1569493" cy="1021022"/>
           </a:xfrm>
@@ -4184,8 +4460,8 @@
         </p:nvSpPr>
         <p:spPr>
           <a:xfrm>
-            <a:off x="320723" y="6556598"/>
-            <a:ext cx="1480782" cy="261610"/>
+            <a:off x="240542" y="4917449"/>
+            <a:ext cx="1110587" cy="334707"/>
           </a:xfrm>
           <a:prstGeom prst="rect">
             <a:avLst/>
@@ -4199,7 +4475,7 @@
           <a:lstStyle/>
           <a:p>
             <a:r>
-              <a:rPr lang="en-US" sz="1100" dirty="0">
+              <a:rPr lang="en-US" sz="825" dirty="0">
                 <a:gradFill flip="none" rotWithShape="1">
                   <a:gsLst>
                     <a:gs pos="0">
@@ -4219,7 +4495,7 @@
               <a:t>Tool Designed by </a:t>
             </a:r>
             <a:r>
-              <a:rPr lang="en-US" sz="1000" dirty="0">
+              <a:rPr lang="en-US" sz="750" dirty="0">
                 <a:gradFill flip="none" rotWithShape="1">
                   <a:gsLst>
                     <a:gs pos="0">
@@ -4238,7 +4514,7 @@
               </a:rPr>
               <a:t>MG</a:t>
             </a:r>
-            <a:endParaRPr lang="en-US" sz="1100" dirty="0">
+            <a:endParaRPr lang="en-US" sz="825" dirty="0">
               <a:gradFill flip="none" rotWithShape="1">
                 <a:gsLst>
                   <a:gs pos="0">
@@ -4286,8 +4562,544 @@
         </p:blipFill>
         <p:spPr>
           <a:xfrm>
-            <a:off x="51181" y="6516806"/>
-            <a:ext cx="341194" cy="341194"/>
+            <a:off x="38386" y="4887604"/>
+            <a:ext cx="255896" cy="255896"/>
+          </a:xfrm>
+          <a:prstGeom prst="rect">
+            <a:avLst/>
+          </a:prstGeom>
+        </p:spPr>
+      </p:pic>
+      <p:sp>
+        <p:nvSpPr>
+          <p:cNvPr id="2" name="Rectangle 1">
+            <a:extLst>
+              <a:ext uri="{FF2B5EF4-FFF2-40B4-BE49-F238E27FC236}">
+                <a16:creationId xmlns:a16="http://schemas.microsoft.com/office/drawing/2014/main" id="{D9DCB745-2A2C-E810-35F5-D7790ED55E35}"/>
+              </a:ext>
+            </a:extLst>
+          </p:cNvPr>
+          <p:cNvSpPr/>
+          <p:nvPr/>
+        </p:nvSpPr>
+        <p:spPr>
+          <a:xfrm>
+            <a:off x="2888772" y="771768"/>
+            <a:ext cx="1070975" cy="822020"/>
+          </a:xfrm>
+          <a:prstGeom prst="rect">
+            <a:avLst/>
+          </a:prstGeom>
+          <a:solidFill>
+            <a:schemeClr val="bg2"/>
+          </a:solidFill>
+        </p:spPr>
+        <p:style>
+          <a:lnRef idx="2">
+            <a:schemeClr val="accent1">
+              <a:shade val="15000"/>
+            </a:schemeClr>
+          </a:lnRef>
+          <a:fillRef idx="1">
+            <a:schemeClr val="accent1"/>
+          </a:fillRef>
+          <a:effectRef idx="0">
+            <a:schemeClr val="accent1"/>
+          </a:effectRef>
+          <a:fontRef idx="minor">
+            <a:schemeClr val="lt1"/>
+          </a:fontRef>
+        </p:style>
+        <p:txBody>
+          <a:bodyPr rtlCol="0" anchor="ctr"/>
+          <a:lstStyle/>
+          <a:p>
+            <a:pPr algn="ctr"/>
+            <a:endParaRPr lang="en-US" sz="1013"/>
+          </a:p>
+        </p:txBody>
+      </p:sp>
+      <p:sp>
+        <p:nvSpPr>
+          <p:cNvPr id="3" name="Rectangle 2">
+            <a:extLst>
+              <a:ext uri="{FF2B5EF4-FFF2-40B4-BE49-F238E27FC236}">
+                <a16:creationId xmlns:a16="http://schemas.microsoft.com/office/drawing/2014/main" id="{E1A27615-C0F6-1E2A-0242-B9060A2AD854}"/>
+              </a:ext>
+            </a:extLst>
+          </p:cNvPr>
+          <p:cNvSpPr/>
+          <p:nvPr/>
+        </p:nvSpPr>
+        <p:spPr>
+          <a:xfrm>
+            <a:off x="4071438" y="771768"/>
+            <a:ext cx="1070975" cy="822020"/>
+          </a:xfrm>
+          <a:prstGeom prst="rect">
+            <a:avLst/>
+          </a:prstGeom>
+          <a:solidFill>
+            <a:schemeClr val="tx2"/>
+          </a:solidFill>
+        </p:spPr>
+        <p:style>
+          <a:lnRef idx="2">
+            <a:schemeClr val="accent1">
+              <a:shade val="15000"/>
+            </a:schemeClr>
+          </a:lnRef>
+          <a:fillRef idx="1">
+            <a:schemeClr val="accent1"/>
+          </a:fillRef>
+          <a:effectRef idx="0">
+            <a:schemeClr val="accent1"/>
+          </a:effectRef>
+          <a:fontRef idx="minor">
+            <a:schemeClr val="lt1"/>
+          </a:fontRef>
+        </p:style>
+        <p:txBody>
+          <a:bodyPr rtlCol="0" anchor="ctr"/>
+          <a:lstStyle/>
+          <a:p>
+            <a:pPr algn="ctr"/>
+            <a:endParaRPr lang="en-US" sz="1013"/>
+          </a:p>
+        </p:txBody>
+      </p:sp>
+      <p:sp>
+        <p:nvSpPr>
+          <p:cNvPr id="6" name="Rectangle 5">
+            <a:extLst>
+              <a:ext uri="{FF2B5EF4-FFF2-40B4-BE49-F238E27FC236}">
+                <a16:creationId xmlns:a16="http://schemas.microsoft.com/office/drawing/2014/main" id="{44206087-7391-8224-E894-4B0C847E4394}"/>
+              </a:ext>
+            </a:extLst>
+          </p:cNvPr>
+          <p:cNvSpPr/>
+          <p:nvPr/>
+        </p:nvSpPr>
+        <p:spPr>
+          <a:xfrm>
+            <a:off x="5254104" y="771767"/>
+            <a:ext cx="1070975" cy="822020"/>
+          </a:xfrm>
+          <a:prstGeom prst="rect">
+            <a:avLst/>
+          </a:prstGeom>
+          <a:solidFill>
+            <a:srgbClr val="00529C"/>
+          </a:solidFill>
+        </p:spPr>
+        <p:style>
+          <a:lnRef idx="2">
+            <a:schemeClr val="accent1">
+              <a:shade val="15000"/>
+            </a:schemeClr>
+          </a:lnRef>
+          <a:fillRef idx="1">
+            <a:schemeClr val="accent1"/>
+          </a:fillRef>
+          <a:effectRef idx="0">
+            <a:schemeClr val="accent1"/>
+          </a:effectRef>
+          <a:fontRef idx="minor">
+            <a:schemeClr val="lt1"/>
+          </a:fontRef>
+        </p:style>
+        <p:txBody>
+          <a:bodyPr rtlCol="0" anchor="ctr"/>
+          <a:lstStyle/>
+          <a:p>
+            <a:pPr algn="ctr"/>
+            <a:endParaRPr lang="en-US" sz="1013"/>
+          </a:p>
+        </p:txBody>
+      </p:sp>
+      <p:sp>
+        <p:nvSpPr>
+          <p:cNvPr id="7" name="Rectangle 6">
+            <a:extLst>
+              <a:ext uri="{FF2B5EF4-FFF2-40B4-BE49-F238E27FC236}">
+                <a16:creationId xmlns:a16="http://schemas.microsoft.com/office/drawing/2014/main" id="{B090590E-E767-1B9A-943B-011B93B8C20B}"/>
+              </a:ext>
+            </a:extLst>
+          </p:cNvPr>
+          <p:cNvSpPr/>
+          <p:nvPr/>
+        </p:nvSpPr>
+        <p:spPr>
+          <a:xfrm>
+            <a:off x="6436769" y="771767"/>
+            <a:ext cx="1070975" cy="822020"/>
+          </a:xfrm>
+          <a:prstGeom prst="rect">
+            <a:avLst/>
+          </a:prstGeom>
+          <a:solidFill>
+            <a:srgbClr val="5ECCF3"/>
+          </a:solidFill>
+        </p:spPr>
+        <p:style>
+          <a:lnRef idx="2">
+            <a:schemeClr val="accent1">
+              <a:shade val="15000"/>
+            </a:schemeClr>
+          </a:lnRef>
+          <a:fillRef idx="1">
+            <a:schemeClr val="accent1"/>
+          </a:fillRef>
+          <a:effectRef idx="0">
+            <a:schemeClr val="accent1"/>
+          </a:effectRef>
+          <a:fontRef idx="minor">
+            <a:schemeClr val="lt1"/>
+          </a:fontRef>
+        </p:style>
+        <p:txBody>
+          <a:bodyPr rtlCol="0" anchor="ctr"/>
+          <a:lstStyle/>
+          <a:p>
+            <a:pPr algn="ctr"/>
+            <a:endParaRPr lang="en-US" sz="1013"/>
+          </a:p>
+        </p:txBody>
+      </p:sp>
+      <p:sp>
+        <p:nvSpPr>
+          <p:cNvPr id="8" name="Rectangle 7">
+            <a:extLst>
+              <a:ext uri="{FF2B5EF4-FFF2-40B4-BE49-F238E27FC236}">
+                <a16:creationId xmlns:a16="http://schemas.microsoft.com/office/drawing/2014/main" id="{BA69A502-75B6-675D-072D-DC23D0492534}"/>
+              </a:ext>
+            </a:extLst>
+          </p:cNvPr>
+          <p:cNvSpPr/>
+          <p:nvPr/>
+        </p:nvSpPr>
+        <p:spPr>
+          <a:xfrm>
+            <a:off x="2888772" y="1733548"/>
+            <a:ext cx="1070975" cy="822020"/>
+          </a:xfrm>
+          <a:prstGeom prst="rect">
+            <a:avLst/>
+          </a:prstGeom>
+          <a:solidFill>
+            <a:srgbClr val="A7EA52"/>
+          </a:solidFill>
+        </p:spPr>
+        <p:style>
+          <a:lnRef idx="2">
+            <a:schemeClr val="accent1">
+              <a:shade val="15000"/>
+            </a:schemeClr>
+          </a:lnRef>
+          <a:fillRef idx="1">
+            <a:schemeClr val="accent1"/>
+          </a:fillRef>
+          <a:effectRef idx="0">
+            <a:schemeClr val="accent1"/>
+          </a:effectRef>
+          <a:fontRef idx="minor">
+            <a:schemeClr val="lt1"/>
+          </a:fontRef>
+        </p:style>
+        <p:txBody>
+          <a:bodyPr rtlCol="0" anchor="ctr"/>
+          <a:lstStyle/>
+          <a:p>
+            <a:pPr algn="ctr"/>
+            <a:endParaRPr lang="en-US" sz="1013"/>
+          </a:p>
+        </p:txBody>
+      </p:sp>
+      <p:sp>
+        <p:nvSpPr>
+          <p:cNvPr id="9" name="Rectangle 8">
+            <a:extLst>
+              <a:ext uri="{FF2B5EF4-FFF2-40B4-BE49-F238E27FC236}">
+                <a16:creationId xmlns:a16="http://schemas.microsoft.com/office/drawing/2014/main" id="{AD78DE3E-1D7E-1338-BECA-47138C870B67}"/>
+              </a:ext>
+            </a:extLst>
+          </p:cNvPr>
+          <p:cNvSpPr/>
+          <p:nvPr/>
+        </p:nvSpPr>
+        <p:spPr>
+          <a:xfrm>
+            <a:off x="4071438" y="1733548"/>
+            <a:ext cx="1070975" cy="822020"/>
+          </a:xfrm>
+          <a:prstGeom prst="rect">
+            <a:avLst/>
+          </a:prstGeom>
+          <a:solidFill>
+            <a:srgbClr val="5DCEAF"/>
+          </a:solidFill>
+        </p:spPr>
+        <p:style>
+          <a:lnRef idx="2">
+            <a:schemeClr val="accent1">
+              <a:shade val="15000"/>
+            </a:schemeClr>
+          </a:lnRef>
+          <a:fillRef idx="1">
+            <a:schemeClr val="accent1"/>
+          </a:fillRef>
+          <a:effectRef idx="0">
+            <a:schemeClr val="accent1"/>
+          </a:effectRef>
+          <a:fontRef idx="minor">
+            <a:schemeClr val="lt1"/>
+          </a:fontRef>
+        </p:style>
+        <p:txBody>
+          <a:bodyPr rtlCol="0" anchor="ctr"/>
+          <a:lstStyle/>
+          <a:p>
+            <a:pPr algn="ctr"/>
+            <a:endParaRPr lang="en-US" sz="1013"/>
+          </a:p>
+        </p:txBody>
+      </p:sp>
+      <p:sp>
+        <p:nvSpPr>
+          <p:cNvPr id="10" name="Rectangle 9">
+            <a:extLst>
+              <a:ext uri="{FF2B5EF4-FFF2-40B4-BE49-F238E27FC236}">
+                <a16:creationId xmlns:a16="http://schemas.microsoft.com/office/drawing/2014/main" id="{16DBB64F-FFBF-019F-D5B6-F183B533D6C6}"/>
+              </a:ext>
+            </a:extLst>
+          </p:cNvPr>
+          <p:cNvSpPr/>
+          <p:nvPr/>
+        </p:nvSpPr>
+        <p:spPr>
+          <a:xfrm>
+            <a:off x="5254104" y="1733547"/>
+            <a:ext cx="1070975" cy="822020"/>
+          </a:xfrm>
+          <a:prstGeom prst="rect">
+            <a:avLst/>
+          </a:prstGeom>
+          <a:solidFill>
+            <a:srgbClr val="FF8021"/>
+          </a:solidFill>
+        </p:spPr>
+        <p:style>
+          <a:lnRef idx="2">
+            <a:schemeClr val="accent1">
+              <a:shade val="15000"/>
+            </a:schemeClr>
+          </a:lnRef>
+          <a:fillRef idx="1">
+            <a:schemeClr val="accent1"/>
+          </a:fillRef>
+          <a:effectRef idx="0">
+            <a:schemeClr val="accent1"/>
+          </a:effectRef>
+          <a:fontRef idx="minor">
+            <a:schemeClr val="lt1"/>
+          </a:fontRef>
+        </p:style>
+        <p:txBody>
+          <a:bodyPr rtlCol="0" anchor="ctr"/>
+          <a:lstStyle/>
+          <a:p>
+            <a:pPr algn="ctr"/>
+            <a:endParaRPr lang="en-US" sz="1013"/>
+          </a:p>
+        </p:txBody>
+      </p:sp>
+      <p:sp>
+        <p:nvSpPr>
+          <p:cNvPr id="11" name="Rectangle 10">
+            <a:extLst>
+              <a:ext uri="{FF2B5EF4-FFF2-40B4-BE49-F238E27FC236}">
+                <a16:creationId xmlns:a16="http://schemas.microsoft.com/office/drawing/2014/main" id="{51726334-12E2-2D36-A01A-106968241435}"/>
+              </a:ext>
+            </a:extLst>
+          </p:cNvPr>
+          <p:cNvSpPr/>
+          <p:nvPr/>
+        </p:nvSpPr>
+        <p:spPr>
+          <a:xfrm>
+            <a:off x="6436769" y="1733547"/>
+            <a:ext cx="1070975" cy="822020"/>
+          </a:xfrm>
+          <a:prstGeom prst="rect">
+            <a:avLst/>
+          </a:prstGeom>
+          <a:solidFill>
+            <a:schemeClr val="accent6"/>
+          </a:solidFill>
+        </p:spPr>
+        <p:style>
+          <a:lnRef idx="2">
+            <a:schemeClr val="accent1">
+              <a:shade val="15000"/>
+            </a:schemeClr>
+          </a:lnRef>
+          <a:fillRef idx="1">
+            <a:schemeClr val="accent1"/>
+          </a:fillRef>
+          <a:effectRef idx="0">
+            <a:schemeClr val="accent1"/>
+          </a:effectRef>
+          <a:fontRef idx="minor">
+            <a:schemeClr val="lt1"/>
+          </a:fontRef>
+        </p:style>
+        <p:txBody>
+          <a:bodyPr rtlCol="0" anchor="ctr"/>
+          <a:lstStyle/>
+          <a:p>
+            <a:pPr algn="ctr"/>
+            <a:endParaRPr lang="en-US" sz="1013"/>
+          </a:p>
+        </p:txBody>
+      </p:sp>
+      <p:pic>
+        <p:nvPicPr>
+          <p:cNvPr id="13" name="Graphic 12" descr="Magnifying glass with solid fill">
+            <a:extLst>
+              <a:ext uri="{FF2B5EF4-FFF2-40B4-BE49-F238E27FC236}">
+                <a16:creationId xmlns:a16="http://schemas.microsoft.com/office/drawing/2014/main" id="{5CD15896-A449-2D59-6592-DF92AD1D4515}"/>
+              </a:ext>
+            </a:extLst>
+          </p:cNvPr>
+          <p:cNvPicPr>
+            <a:picLocks noChangeAspect="1"/>
+          </p:cNvPicPr>
+          <p:nvPr/>
+        </p:nvPicPr>
+        <p:blipFill>
+          <a:blip r:embed="rId8">
+            <a:extLst>
+              <a:ext uri="{96DAC541-7B7A-43D3-8B79-37D633B846F1}">
+                <asvg:svgBlip xmlns:asvg="http://schemas.microsoft.com/office/drawing/2016/SVG/main" r:embed="rId9"/>
+              </a:ext>
+            </a:extLst>
+          </a:blip>
+          <a:stretch>
+            <a:fillRect/>
+          </a:stretch>
+        </p:blipFill>
+        <p:spPr>
+          <a:xfrm>
+            <a:off x="92629" y="429832"/>
+            <a:ext cx="878772" cy="878772"/>
+          </a:xfrm>
+          <a:prstGeom prst="rect">
+            <a:avLst/>
+          </a:prstGeom>
+        </p:spPr>
+      </p:pic>
+      <p:pic>
+        <p:nvPicPr>
+          <p:cNvPr id="15" name="Graphic 14" descr="Gears with solid fill">
+            <a:extLst>
+              <a:ext uri="{FF2B5EF4-FFF2-40B4-BE49-F238E27FC236}">
+                <a16:creationId xmlns:a16="http://schemas.microsoft.com/office/drawing/2014/main" id="{564DE6C1-5545-1CFC-76A8-8D4431FBD88C}"/>
+              </a:ext>
+            </a:extLst>
+          </p:cNvPr>
+          <p:cNvPicPr>
+            <a:picLocks noChangeAspect="1"/>
+          </p:cNvPicPr>
+          <p:nvPr/>
+        </p:nvPicPr>
+        <p:blipFill>
+          <a:blip r:embed="rId10">
+            <a:extLst>
+              <a:ext uri="{96DAC541-7B7A-43D3-8B79-37D633B846F1}">
+                <asvg:svgBlip xmlns:asvg="http://schemas.microsoft.com/office/drawing/2016/SVG/main" r:embed="rId11"/>
+              </a:ext>
+            </a:extLst>
+          </a:blip>
+          <a:stretch>
+            <a:fillRect/>
+          </a:stretch>
+        </p:blipFill>
+        <p:spPr>
+          <a:xfrm>
+            <a:off x="57001" y="2754228"/>
+            <a:ext cx="914400" cy="914400"/>
+          </a:xfrm>
+          <a:prstGeom prst="rect">
+            <a:avLst/>
+          </a:prstGeom>
+        </p:spPr>
+      </p:pic>
+      <p:pic>
+        <p:nvPicPr>
+          <p:cNvPr id="19" name="Graphic 18" descr="Graduation cap with solid fill">
+            <a:extLst>
+              <a:ext uri="{FF2B5EF4-FFF2-40B4-BE49-F238E27FC236}">
+                <a16:creationId xmlns:a16="http://schemas.microsoft.com/office/drawing/2014/main" id="{44D05A9C-A2C7-EFD9-B4DB-A1E5CEFB8057}"/>
+              </a:ext>
+            </a:extLst>
+          </p:cNvPr>
+          <p:cNvPicPr>
+            <a:picLocks noChangeAspect="1"/>
+          </p:cNvPicPr>
+          <p:nvPr/>
+        </p:nvPicPr>
+        <p:blipFill>
+          <a:blip r:embed="rId12">
+            <a:extLst>
+              <a:ext uri="{96DAC541-7B7A-43D3-8B79-37D633B846F1}">
+                <asvg:svgBlip xmlns:asvg="http://schemas.microsoft.com/office/drawing/2016/SVG/main" r:embed="rId13"/>
+              </a:ext>
+            </a:extLst>
+          </a:blip>
+          <a:stretch>
+            <a:fillRect/>
+          </a:stretch>
+        </p:blipFill>
+        <p:spPr>
+          <a:xfrm>
+            <a:off x="75616" y="1967554"/>
+            <a:ext cx="914400" cy="914400"/>
+          </a:xfrm>
+          <a:prstGeom prst="rect">
+            <a:avLst/>
+          </a:prstGeom>
+        </p:spPr>
+      </p:pic>
+      <p:pic>
+        <p:nvPicPr>
+          <p:cNvPr id="25" name="Graphic 24" descr="Marker with solid fill">
+            <a:extLst>
+              <a:ext uri="{FF2B5EF4-FFF2-40B4-BE49-F238E27FC236}">
+                <a16:creationId xmlns:a16="http://schemas.microsoft.com/office/drawing/2014/main" id="{F0E4A08A-3515-3917-155E-B1B992684C5E}"/>
+              </a:ext>
+            </a:extLst>
+          </p:cNvPr>
+          <p:cNvPicPr>
+            <a:picLocks noChangeAspect="1"/>
+          </p:cNvPicPr>
+          <p:nvPr/>
+        </p:nvPicPr>
+        <p:blipFill>
+          <a:blip r:embed="rId14">
+            <a:extLst>
+              <a:ext uri="{96DAC541-7B7A-43D3-8B79-37D633B846F1}">
+                <asvg:svgBlip xmlns:asvg="http://schemas.microsoft.com/office/drawing/2016/SVG/main" r:embed="rId15"/>
+              </a:ext>
+            </a:extLst>
+          </a:blip>
+          <a:stretch>
+            <a:fillRect/>
+          </a:stretch>
+        </p:blipFill>
+        <p:spPr>
+          <a:xfrm>
+            <a:off x="94231" y="1180879"/>
+            <a:ext cx="914400" cy="914400"/>
           </a:xfrm>
           <a:prstGeom prst="rect">
             <a:avLst/>
@@ -4307,10 +5119,1013 @@
 </p:sld>
 </file>
 
+<file path=ppt/slides/slide3.xml><?xml version="1.0" encoding="utf-8"?>
+<p:sld xmlns:a="http://schemas.openxmlformats.org/drawingml/2006/main" xmlns:r="http://schemas.openxmlformats.org/officeDocument/2006/relationships" xmlns:p="http://schemas.openxmlformats.org/presentationml/2006/main">
+  <p:cSld>
+    <p:bg>
+      <p:bgPr>
+        <a:solidFill>
+          <a:srgbClr val="D9EDFF"/>
+        </a:solidFill>
+        <a:effectLst/>
+      </p:bgPr>
+    </p:bg>
+    <p:spTree>
+      <p:nvGrpSpPr>
+        <p:cNvPr id="1" name=""/>
+        <p:cNvGrpSpPr/>
+        <p:nvPr/>
+      </p:nvGrpSpPr>
+      <p:grpSpPr>
+        <a:xfrm>
+          <a:off x="0" y="0"/>
+          <a:ext cx="0" cy="0"/>
+          <a:chOff x="0" y="0"/>
+          <a:chExt cx="0" cy="0"/>
+        </a:xfrm>
+      </p:grpSpPr>
+      <p:sp>
+        <p:nvSpPr>
+          <p:cNvPr id="4" name="Freeform: Shape 3">
+            <a:extLst>
+              <a:ext uri="{FF2B5EF4-FFF2-40B4-BE49-F238E27FC236}">
+                <a16:creationId xmlns:a16="http://schemas.microsoft.com/office/drawing/2014/main" id="{90B3CCA7-C826-EA4F-2FA7-B4E5ADE28917}"/>
+              </a:ext>
+            </a:extLst>
+          </p:cNvPr>
+          <p:cNvSpPr/>
+          <p:nvPr/>
+        </p:nvSpPr>
+        <p:spPr>
+          <a:xfrm>
+            <a:off x="1" y="1"/>
+            <a:ext cx="9143999" cy="399197"/>
+          </a:xfrm>
+          <a:custGeom>
+            <a:avLst/>
+            <a:gdLst>
+              <a:gd name="connsiteX0" fmla="*/ 0 w 12191999"/>
+              <a:gd name="connsiteY0" fmla="*/ 0 h 532263"/>
+              <a:gd name="connsiteX1" fmla="*/ 9294123 w 12191999"/>
+              <a:gd name="connsiteY1" fmla="*/ 0 h 532263"/>
+              <a:gd name="connsiteX2" fmla="*/ 9457899 w 12191999"/>
+              <a:gd name="connsiteY2" fmla="*/ 0 h 532263"/>
+              <a:gd name="connsiteX3" fmla="*/ 12191999 w 12191999"/>
+              <a:gd name="connsiteY3" fmla="*/ 0 h 532263"/>
+              <a:gd name="connsiteX4" fmla="*/ 12191999 w 12191999"/>
+              <a:gd name="connsiteY4" fmla="*/ 532263 h 532263"/>
+              <a:gd name="connsiteX5" fmla="*/ 9520596 w 12191999"/>
+              <a:gd name="connsiteY5" fmla="*/ 532263 h 532263"/>
+              <a:gd name="connsiteX6" fmla="*/ 9294123 w 12191999"/>
+              <a:gd name="connsiteY6" fmla="*/ 305790 h 532263"/>
+              <a:gd name="connsiteX7" fmla="*/ 9294123 w 12191999"/>
+              <a:gd name="connsiteY7" fmla="*/ 300251 h 532263"/>
+              <a:gd name="connsiteX8" fmla="*/ 0 w 12191999"/>
+              <a:gd name="connsiteY8" fmla="*/ 300251 h 532263"/>
+            </a:gdLst>
+            <a:ahLst/>
+            <a:cxnLst>
+              <a:cxn ang="0">
+                <a:pos x="connsiteX0" y="connsiteY0"/>
+              </a:cxn>
+              <a:cxn ang="0">
+                <a:pos x="connsiteX1" y="connsiteY1"/>
+              </a:cxn>
+              <a:cxn ang="0">
+                <a:pos x="connsiteX2" y="connsiteY2"/>
+              </a:cxn>
+              <a:cxn ang="0">
+                <a:pos x="connsiteX3" y="connsiteY3"/>
+              </a:cxn>
+              <a:cxn ang="0">
+                <a:pos x="connsiteX4" y="connsiteY4"/>
+              </a:cxn>
+              <a:cxn ang="0">
+                <a:pos x="connsiteX5" y="connsiteY5"/>
+              </a:cxn>
+              <a:cxn ang="0">
+                <a:pos x="connsiteX6" y="connsiteY6"/>
+              </a:cxn>
+              <a:cxn ang="0">
+                <a:pos x="connsiteX7" y="connsiteY7"/>
+              </a:cxn>
+              <a:cxn ang="0">
+                <a:pos x="connsiteX8" y="connsiteY8"/>
+              </a:cxn>
+            </a:cxnLst>
+            <a:rect l="l" t="t" r="r" b="b"/>
+            <a:pathLst>
+              <a:path w="12191999" h="532263">
+                <a:moveTo>
+                  <a:pt x="0" y="0"/>
+                </a:moveTo>
+                <a:lnTo>
+                  <a:pt x="9294123" y="0"/>
+                </a:lnTo>
+                <a:lnTo>
+                  <a:pt x="9457899" y="0"/>
+                </a:lnTo>
+                <a:lnTo>
+                  <a:pt x="12191999" y="0"/>
+                </a:lnTo>
+                <a:lnTo>
+                  <a:pt x="12191999" y="532263"/>
+                </a:lnTo>
+                <a:lnTo>
+                  <a:pt x="9520596" y="532263"/>
+                </a:lnTo>
+                <a:lnTo>
+                  <a:pt x="9294123" y="305790"/>
+                </a:lnTo>
+                <a:lnTo>
+                  <a:pt x="9294123" y="300251"/>
+                </a:lnTo>
+                <a:lnTo>
+                  <a:pt x="0" y="300251"/>
+                </a:lnTo>
+                <a:close/>
+              </a:path>
+            </a:pathLst>
+          </a:custGeom>
+          <a:solidFill>
+            <a:schemeClr val="bg1"/>
+          </a:solidFill>
+          <a:ln>
+            <a:gradFill>
+              <a:gsLst>
+                <a:gs pos="0">
+                  <a:schemeClr val="bg1"/>
+                </a:gs>
+                <a:gs pos="100000">
+                  <a:schemeClr val="bg2">
+                    <a:lumMod val="90000"/>
+                  </a:schemeClr>
+                </a:gs>
+                <a:gs pos="45000">
+                  <a:srgbClr val="A7D6F9"/>
+                </a:gs>
+                <a:gs pos="69000">
+                  <a:schemeClr val="accent1"/>
+                </a:gs>
+              </a:gsLst>
+              <a:lin ang="5400000" scaled="1"/>
+            </a:gradFill>
+          </a:ln>
+        </p:spPr>
+        <p:style>
+          <a:lnRef idx="2">
+            <a:schemeClr val="accent1">
+              <a:shade val="15000"/>
+            </a:schemeClr>
+          </a:lnRef>
+          <a:fillRef idx="1">
+            <a:schemeClr val="accent1"/>
+          </a:fillRef>
+          <a:effectRef idx="0">
+            <a:schemeClr val="accent1"/>
+          </a:effectRef>
+          <a:fontRef idx="minor">
+            <a:schemeClr val="lt1"/>
+          </a:fontRef>
+        </p:style>
+        <p:txBody>
+          <a:bodyPr wrap="square" rtlCol="0" anchor="ctr">
+            <a:noAutofit/>
+          </a:bodyPr>
+          <a:lstStyle/>
+          <a:p>
+            <a:pPr algn="ctr"/>
+            <a:endParaRPr lang="en-US">
+              <a:solidFill>
+                <a:prstClr val="white"/>
+              </a:solidFill>
+              <a:latin typeface="Calibri" panose="020F0502020204030204"/>
+            </a:endParaRPr>
+          </a:p>
+        </p:txBody>
+      </p:sp>
+      <p:sp>
+        <p:nvSpPr>
+          <p:cNvPr id="5" name="Freeform: Shape 4">
+            <a:extLst>
+              <a:ext uri="{FF2B5EF4-FFF2-40B4-BE49-F238E27FC236}">
+                <a16:creationId xmlns:a16="http://schemas.microsoft.com/office/drawing/2014/main" id="{5AAB2EF3-543C-49AB-E29A-C18D223503E2}"/>
+              </a:ext>
+            </a:extLst>
+          </p:cNvPr>
+          <p:cNvSpPr/>
+          <p:nvPr/>
+        </p:nvSpPr>
+        <p:spPr>
+          <a:xfrm flipH="1" flipV="1">
+            <a:off x="0" y="4887604"/>
+            <a:ext cx="9144000" cy="255896"/>
+          </a:xfrm>
+          <a:custGeom>
+            <a:avLst/>
+            <a:gdLst>
+              <a:gd name="connsiteX0" fmla="*/ 0 w 12191999"/>
+              <a:gd name="connsiteY0" fmla="*/ 0 h 532263"/>
+              <a:gd name="connsiteX1" fmla="*/ 9294123 w 12191999"/>
+              <a:gd name="connsiteY1" fmla="*/ 0 h 532263"/>
+              <a:gd name="connsiteX2" fmla="*/ 9457899 w 12191999"/>
+              <a:gd name="connsiteY2" fmla="*/ 0 h 532263"/>
+              <a:gd name="connsiteX3" fmla="*/ 12191999 w 12191999"/>
+              <a:gd name="connsiteY3" fmla="*/ 0 h 532263"/>
+              <a:gd name="connsiteX4" fmla="*/ 12191999 w 12191999"/>
+              <a:gd name="connsiteY4" fmla="*/ 532263 h 532263"/>
+              <a:gd name="connsiteX5" fmla="*/ 9520596 w 12191999"/>
+              <a:gd name="connsiteY5" fmla="*/ 532263 h 532263"/>
+              <a:gd name="connsiteX6" fmla="*/ 9294123 w 12191999"/>
+              <a:gd name="connsiteY6" fmla="*/ 305790 h 532263"/>
+              <a:gd name="connsiteX7" fmla="*/ 9294123 w 12191999"/>
+              <a:gd name="connsiteY7" fmla="*/ 300251 h 532263"/>
+              <a:gd name="connsiteX8" fmla="*/ 0 w 12191999"/>
+              <a:gd name="connsiteY8" fmla="*/ 300251 h 532263"/>
+            </a:gdLst>
+            <a:ahLst/>
+            <a:cxnLst>
+              <a:cxn ang="0">
+                <a:pos x="connsiteX0" y="connsiteY0"/>
+              </a:cxn>
+              <a:cxn ang="0">
+                <a:pos x="connsiteX1" y="connsiteY1"/>
+              </a:cxn>
+              <a:cxn ang="0">
+                <a:pos x="connsiteX2" y="connsiteY2"/>
+              </a:cxn>
+              <a:cxn ang="0">
+                <a:pos x="connsiteX3" y="connsiteY3"/>
+              </a:cxn>
+              <a:cxn ang="0">
+                <a:pos x="connsiteX4" y="connsiteY4"/>
+              </a:cxn>
+              <a:cxn ang="0">
+                <a:pos x="connsiteX5" y="connsiteY5"/>
+              </a:cxn>
+              <a:cxn ang="0">
+                <a:pos x="connsiteX6" y="connsiteY6"/>
+              </a:cxn>
+              <a:cxn ang="0">
+                <a:pos x="connsiteX7" y="connsiteY7"/>
+              </a:cxn>
+              <a:cxn ang="0">
+                <a:pos x="connsiteX8" y="connsiteY8"/>
+              </a:cxn>
+            </a:cxnLst>
+            <a:rect l="l" t="t" r="r" b="b"/>
+            <a:pathLst>
+              <a:path w="12191999" h="532263">
+                <a:moveTo>
+                  <a:pt x="0" y="0"/>
+                </a:moveTo>
+                <a:lnTo>
+                  <a:pt x="9294123" y="0"/>
+                </a:lnTo>
+                <a:lnTo>
+                  <a:pt x="9457899" y="0"/>
+                </a:lnTo>
+                <a:lnTo>
+                  <a:pt x="12191999" y="0"/>
+                </a:lnTo>
+                <a:lnTo>
+                  <a:pt x="12191999" y="532263"/>
+                </a:lnTo>
+                <a:lnTo>
+                  <a:pt x="9520596" y="532263"/>
+                </a:lnTo>
+                <a:lnTo>
+                  <a:pt x="9294123" y="305790"/>
+                </a:lnTo>
+                <a:lnTo>
+                  <a:pt x="9294123" y="300251"/>
+                </a:lnTo>
+                <a:lnTo>
+                  <a:pt x="0" y="300251"/>
+                </a:lnTo>
+                <a:close/>
+              </a:path>
+            </a:pathLst>
+          </a:custGeom>
+          <a:solidFill>
+            <a:schemeClr val="bg1"/>
+          </a:solidFill>
+          <a:ln>
+            <a:gradFill>
+              <a:gsLst>
+                <a:gs pos="0">
+                  <a:schemeClr val="bg1"/>
+                </a:gs>
+                <a:gs pos="100000">
+                  <a:schemeClr val="bg1"/>
+                </a:gs>
+                <a:gs pos="100000">
+                  <a:schemeClr val="bg2">
+                    <a:lumMod val="90000"/>
+                  </a:schemeClr>
+                </a:gs>
+                <a:gs pos="45000">
+                  <a:schemeClr val="bg2">
+                    <a:lumMod val="75000"/>
+                  </a:schemeClr>
+                </a:gs>
+              </a:gsLst>
+              <a:lin ang="5400000" scaled="1"/>
+            </a:gradFill>
+          </a:ln>
+        </p:spPr>
+        <p:style>
+          <a:lnRef idx="2">
+            <a:schemeClr val="accent1">
+              <a:shade val="15000"/>
+            </a:schemeClr>
+          </a:lnRef>
+          <a:fillRef idx="1">
+            <a:schemeClr val="accent1"/>
+          </a:fillRef>
+          <a:effectRef idx="0">
+            <a:schemeClr val="accent1"/>
+          </a:effectRef>
+          <a:fontRef idx="minor">
+            <a:schemeClr val="lt1"/>
+          </a:fontRef>
+        </p:style>
+        <p:txBody>
+          <a:bodyPr wrap="square" rtlCol="0" anchor="ctr">
+            <a:noAutofit/>
+          </a:bodyPr>
+          <a:lstStyle/>
+          <a:p>
+            <a:pPr algn="ctr"/>
+            <a:endParaRPr lang="en-US">
+              <a:solidFill>
+                <a:prstClr val="white"/>
+              </a:solidFill>
+              <a:latin typeface="Calibri" panose="020F0502020204030204"/>
+            </a:endParaRPr>
+          </a:p>
+        </p:txBody>
+      </p:sp>
+      <p:sp>
+        <p:nvSpPr>
+          <p:cNvPr id="16" name="TextBox 15">
+            <a:extLst>
+              <a:ext uri="{FF2B5EF4-FFF2-40B4-BE49-F238E27FC236}">
+                <a16:creationId xmlns:a16="http://schemas.microsoft.com/office/drawing/2014/main" id="{27A4DA0D-4CC0-68E0-B2D5-06265782E0D8}"/>
+              </a:ext>
+            </a:extLst>
+          </p:cNvPr>
+          <p:cNvSpPr txBox="1"/>
+          <p:nvPr/>
+        </p:nvSpPr>
+        <p:spPr>
+          <a:xfrm>
+            <a:off x="7113897" y="137588"/>
+            <a:ext cx="1658204" cy="297517"/>
+          </a:xfrm>
+          <a:prstGeom prst="rect">
+            <a:avLst/>
+          </a:prstGeom>
+          <a:noFill/>
+        </p:spPr>
+        <p:txBody>
+          <a:bodyPr wrap="square" rtlCol="0">
+            <a:spAutoFit/>
+          </a:bodyPr>
+          <a:lstStyle/>
+          <a:p>
+            <a:pPr>
+              <a:lnSpc>
+                <a:spcPts val="750"/>
+              </a:lnSpc>
+            </a:pPr>
+            <a:r>
+              <a:rPr lang="en-US" sz="1500" dirty="0">
+                <a:solidFill>
+                  <a:srgbClr val="00529C"/>
+                </a:solidFill>
+                <a:latin typeface="Trade Gothic Inline" panose="020F0502020204030204" pitchFamily="34" charset="0"/>
+                <a:ea typeface="STXihei" panose="020B0503020204020204" pitchFamily="2" charset="-122"/>
+              </a:rPr>
+              <a:t>MG </a:t>
+            </a:r>
+            <a:r>
+              <a:rPr lang="en-US" sz="1500" dirty="0">
+                <a:solidFill>
+                  <a:srgbClr val="E0144C"/>
+                </a:solidFill>
+                <a:latin typeface="Trade Gothic Inline" panose="020F0502020204030204" pitchFamily="34" charset="0"/>
+                <a:ea typeface="STXihei" panose="020B0503020204020204" pitchFamily="2" charset="-122"/>
+              </a:rPr>
+              <a:t>ANALYTICS</a:t>
+            </a:r>
+            <a:br>
+              <a:rPr lang="en-US" sz="1800" spc="225" dirty="0">
+                <a:solidFill>
+                  <a:srgbClr val="E0144C"/>
+                </a:solidFill>
+                <a:latin typeface="Trade Gothic Inline" panose="020F0502020204030204" pitchFamily="34" charset="0"/>
+                <a:ea typeface="STXihei" panose="020B0503020204020204" pitchFamily="2" charset="-122"/>
+              </a:rPr>
+            </a:br>
+            <a:r>
+              <a:rPr lang="en-US" sz="750" dirty="0">
+                <a:gradFill flip="none" rotWithShape="1">
+                  <a:gsLst>
+                    <a:gs pos="0">
+                      <a:srgbClr val="00529C"/>
+                    </a:gs>
+                    <a:gs pos="100000">
+                      <a:srgbClr val="E0144C"/>
+                    </a:gs>
+                  </a:gsLst>
+                  <a:lin ang="0" scaled="1"/>
+                  <a:tileRect/>
+                </a:gradFill>
+                <a:latin typeface="Segoe UI Light" panose="020B0502040204020203" pitchFamily="34" charset="0"/>
+                <a:ea typeface="STXihei" panose="020B0503020204020204" pitchFamily="2" charset="-122"/>
+                <a:cs typeface="Segoe UI Light" panose="020B0502040204020203" pitchFamily="34" charset="0"/>
+              </a:rPr>
+              <a:t>AUSTIN REAL ESTATE INSIGHTS</a:t>
+            </a:r>
+            <a:endParaRPr lang="en-US" sz="750" dirty="0">
+              <a:gradFill flip="none" rotWithShape="1">
+                <a:gsLst>
+                  <a:gs pos="0">
+                    <a:srgbClr val="00529C"/>
+                  </a:gs>
+                  <a:gs pos="100000">
+                    <a:srgbClr val="E0144C"/>
+                  </a:gs>
+                </a:gsLst>
+                <a:lin ang="0" scaled="1"/>
+                <a:tileRect/>
+              </a:gradFill>
+              <a:latin typeface="Trade Gothic Inline" panose="020F0502020204030204" pitchFamily="34" charset="0"/>
+              <a:ea typeface="STXihei" panose="020B0503020204020204" pitchFamily="2" charset="-122"/>
+            </a:endParaRPr>
+          </a:p>
+        </p:txBody>
+      </p:sp>
+      <p:grpSp>
+        <p:nvGrpSpPr>
+          <p:cNvPr id="21" name="Group 20">
+            <a:extLst>
+              <a:ext uri="{FF2B5EF4-FFF2-40B4-BE49-F238E27FC236}">
+                <a16:creationId xmlns:a16="http://schemas.microsoft.com/office/drawing/2014/main" id="{D9BD3554-C294-EEEA-1F88-B2AEE33D12FA}"/>
+              </a:ext>
+            </a:extLst>
+          </p:cNvPr>
+          <p:cNvGrpSpPr/>
+          <p:nvPr/>
+        </p:nvGrpSpPr>
+        <p:grpSpPr>
+          <a:xfrm>
+            <a:off x="8563972" y="5758"/>
+            <a:ext cx="504965" cy="352496"/>
+            <a:chOff x="5181600" y="1236829"/>
+            <a:chExt cx="1569493" cy="1021022"/>
+          </a:xfrm>
+          <a:effectLst>
+            <a:outerShdw blurRad="50800" dist="38100" algn="l" rotWithShape="0">
+              <a:prstClr val="black">
+                <a:alpha val="40000"/>
+              </a:prstClr>
+            </a:outerShdw>
+          </a:effectLst>
+        </p:grpSpPr>
+        <p:pic>
+          <p:nvPicPr>
+            <p:cNvPr id="18" name="Graphic 17" descr="Bar chart outline">
+              <a:extLst>
+                <a:ext uri="{FF2B5EF4-FFF2-40B4-BE49-F238E27FC236}">
+                  <a16:creationId xmlns:a16="http://schemas.microsoft.com/office/drawing/2014/main" id="{F0C9D0F2-4CB0-6BE8-6CB0-58C36713409F}"/>
+                </a:ext>
+              </a:extLst>
+            </p:cNvPr>
+            <p:cNvPicPr>
+              <a:picLocks noChangeAspect="1"/>
+            </p:cNvPicPr>
+            <p:nvPr/>
+          </p:nvPicPr>
+          <p:blipFill>
+            <a:blip r:embed="rId2">
+              <a:extLst>
+                <a:ext uri="{96DAC541-7B7A-43D3-8B79-37D633B846F1}">
+                  <asvg:svgBlip xmlns:asvg="http://schemas.microsoft.com/office/drawing/2016/SVG/main" r:embed="rId3"/>
+                </a:ext>
+              </a:extLst>
+            </a:blip>
+            <a:stretch>
+              <a:fillRect/>
+            </a:stretch>
+          </p:blipFill>
+          <p:spPr>
+            <a:xfrm>
+              <a:off x="5836693" y="1343451"/>
+              <a:ext cx="914400" cy="914400"/>
+            </a:xfrm>
+            <a:prstGeom prst="rect">
+              <a:avLst/>
+            </a:prstGeom>
+          </p:spPr>
+        </p:pic>
+        <p:pic>
+          <p:nvPicPr>
+            <p:cNvPr id="20" name="Graphic 19" descr="Home outline">
+              <a:extLst>
+                <a:ext uri="{FF2B5EF4-FFF2-40B4-BE49-F238E27FC236}">
+                  <a16:creationId xmlns:a16="http://schemas.microsoft.com/office/drawing/2014/main" id="{1514EB51-3E41-85EB-DF15-72111C54F28C}"/>
+                </a:ext>
+              </a:extLst>
+            </p:cNvPr>
+            <p:cNvPicPr>
+              <a:picLocks noChangeAspect="1"/>
+            </p:cNvPicPr>
+            <p:nvPr/>
+          </p:nvPicPr>
+          <p:blipFill>
+            <a:blip r:embed="rId4">
+              <a:extLst>
+                <a:ext uri="{96DAC541-7B7A-43D3-8B79-37D633B846F1}">
+                  <asvg:svgBlip xmlns:asvg="http://schemas.microsoft.com/office/drawing/2016/SVG/main" r:embed="rId5"/>
+                </a:ext>
+              </a:extLst>
+            </a:blip>
+            <a:stretch>
+              <a:fillRect/>
+            </a:stretch>
+          </p:blipFill>
+          <p:spPr>
+            <a:xfrm>
+              <a:off x="5181600" y="1236829"/>
+              <a:ext cx="914400" cy="914400"/>
+            </a:xfrm>
+            <a:prstGeom prst="rect">
+              <a:avLst/>
+            </a:prstGeom>
+          </p:spPr>
+        </p:pic>
+      </p:grpSp>
+      <p:sp>
+        <p:nvSpPr>
+          <p:cNvPr id="22" name="TextBox 21">
+            <a:extLst>
+              <a:ext uri="{FF2B5EF4-FFF2-40B4-BE49-F238E27FC236}">
+                <a16:creationId xmlns:a16="http://schemas.microsoft.com/office/drawing/2014/main" id="{781A4499-CAB6-0D82-BC5B-7F94519CBB57}"/>
+              </a:ext>
+            </a:extLst>
+          </p:cNvPr>
+          <p:cNvSpPr txBox="1"/>
+          <p:nvPr/>
+        </p:nvSpPr>
+        <p:spPr>
+          <a:xfrm>
+            <a:off x="240542" y="4917449"/>
+            <a:ext cx="1333734" cy="219291"/>
+          </a:xfrm>
+          <a:prstGeom prst="rect">
+            <a:avLst/>
+          </a:prstGeom>
+          <a:noFill/>
+        </p:spPr>
+        <p:txBody>
+          <a:bodyPr wrap="square" rtlCol="0">
+            <a:spAutoFit/>
+          </a:bodyPr>
+          <a:lstStyle/>
+          <a:p>
+            <a:r>
+              <a:rPr lang="en-US" sz="825" dirty="0">
+                <a:gradFill flip="none" rotWithShape="1">
+                  <a:gsLst>
+                    <a:gs pos="0">
+                      <a:srgbClr val="00529C"/>
+                    </a:gs>
+                    <a:gs pos="100000">
+                      <a:srgbClr val="E0144C"/>
+                    </a:gs>
+                  </a:gsLst>
+                  <a:lin ang="0" scaled="1"/>
+                  <a:tileRect/>
+                </a:gradFill>
+                <a:latin typeface="Segoe UI Light" panose="020B0502040204020203" pitchFamily="34" charset="0"/>
+                <a:ea typeface="STXihei" panose="020B0503020204020204" pitchFamily="2" charset="-122"/>
+                <a:cs typeface="Segoe UI Light" panose="020B0502040204020203" pitchFamily="34" charset="0"/>
+              </a:rPr>
+              <a:t>Tool Designed by </a:t>
+            </a:r>
+            <a:r>
+              <a:rPr lang="en-US" sz="750" dirty="0">
+                <a:gradFill flip="none" rotWithShape="1">
+                  <a:gsLst>
+                    <a:gs pos="0">
+                      <a:srgbClr val="00529C"/>
+                    </a:gs>
+                    <a:gs pos="100000">
+                      <a:srgbClr val="E0144C"/>
+                    </a:gs>
+                  </a:gsLst>
+                  <a:lin ang="0" scaled="1"/>
+                  <a:tileRect/>
+                </a:gradFill>
+                <a:latin typeface="Segoe UI Light" panose="020B0502040204020203" pitchFamily="34" charset="0"/>
+                <a:ea typeface="STXihei" panose="020B0503020204020204" pitchFamily="2" charset="-122"/>
+                <a:cs typeface="Segoe UI Light" panose="020B0502040204020203" pitchFamily="34" charset="0"/>
+              </a:rPr>
+              <a:t>MG</a:t>
+            </a:r>
+            <a:endParaRPr lang="en-US" sz="825" dirty="0">
+              <a:gradFill flip="none" rotWithShape="1">
+                <a:gsLst>
+                  <a:gs pos="0">
+                    <a:srgbClr val="00529C"/>
+                  </a:gs>
+                  <a:gs pos="100000">
+                    <a:srgbClr val="E0144C"/>
+                  </a:gs>
+                </a:gsLst>
+                <a:lin ang="0" scaled="1"/>
+                <a:tileRect/>
+              </a:gradFill>
+              <a:latin typeface="Segoe UI Light" panose="020B0502040204020203" pitchFamily="34" charset="0"/>
+              <a:ea typeface="STXihei" panose="020B0503020204020204" pitchFamily="2" charset="-122"/>
+              <a:cs typeface="Segoe UI Light" panose="020B0502040204020203" pitchFamily="34" charset="0"/>
+            </a:endParaRPr>
+          </a:p>
+        </p:txBody>
+      </p:sp>
+      <p:pic>
+        <p:nvPicPr>
+          <p:cNvPr id="24" name="Graphic 23" descr="Pie chart with solid fill">
+            <a:extLst>
+              <a:ext uri="{FF2B5EF4-FFF2-40B4-BE49-F238E27FC236}">
+                <a16:creationId xmlns:a16="http://schemas.microsoft.com/office/drawing/2014/main" id="{6938ABEE-F404-5DE2-4F47-02BD25220C22}"/>
+              </a:ext>
+            </a:extLst>
+          </p:cNvPr>
+          <p:cNvPicPr>
+            <a:picLocks noChangeAspect="1"/>
+          </p:cNvPicPr>
+          <p:nvPr/>
+        </p:nvPicPr>
+        <p:blipFill>
+          <a:blip r:embed="rId6">
+            <a:extLst>
+              <a:ext uri="{96DAC541-7B7A-43D3-8B79-37D633B846F1}">
+                <asvg:svgBlip xmlns:asvg="http://schemas.microsoft.com/office/drawing/2016/SVG/main" r:embed="rId7"/>
+              </a:ext>
+            </a:extLst>
+          </a:blip>
+          <a:stretch>
+            <a:fillRect/>
+          </a:stretch>
+        </p:blipFill>
+        <p:spPr>
+          <a:xfrm>
+            <a:off x="38386" y="4887604"/>
+            <a:ext cx="255896" cy="255896"/>
+          </a:xfrm>
+          <a:prstGeom prst="rect">
+            <a:avLst/>
+          </a:prstGeom>
+        </p:spPr>
+      </p:pic>
+    </p:spTree>
+    <p:extLst>
+      <p:ext uri="{BB962C8B-B14F-4D97-AF65-F5344CB8AC3E}">
+        <p14:creationId xmlns:p14="http://schemas.microsoft.com/office/powerpoint/2010/main" val="736529973"/>
+      </p:ext>
+    </p:extLst>
+  </p:cSld>
+  <p:clrMapOvr>
+    <a:masterClrMapping/>
+  </p:clrMapOvr>
+</p:sld>
+</file>
+
+<file path=ppt/slides/slide4.xml><?xml version="1.0" encoding="utf-8"?>
+<p:sld xmlns:a="http://schemas.openxmlformats.org/drawingml/2006/main" xmlns:r="http://schemas.openxmlformats.org/officeDocument/2006/relationships" xmlns:p="http://schemas.openxmlformats.org/presentationml/2006/main">
+  <p:cSld>
+    <p:spTree>
+      <p:nvGrpSpPr>
+        <p:cNvPr id="1" name=""/>
+        <p:cNvGrpSpPr/>
+        <p:nvPr/>
+      </p:nvGrpSpPr>
+      <p:grpSpPr>
+        <a:xfrm>
+          <a:off x="0" y="0"/>
+          <a:ext cx="0" cy="0"/>
+          <a:chOff x="0" y="0"/>
+          <a:chExt cx="0" cy="0"/>
+        </a:xfrm>
+      </p:grpSpPr>
+      <p:pic>
+        <p:nvPicPr>
+          <p:cNvPr id="4" name="Graphic 3" descr="Magnifying glass with solid fill">
+            <a:extLst>
+              <a:ext uri="{FF2B5EF4-FFF2-40B4-BE49-F238E27FC236}">
+                <a16:creationId xmlns:a16="http://schemas.microsoft.com/office/drawing/2014/main" id="{AA956881-844C-A179-8530-BA09340BA9E7}"/>
+              </a:ext>
+            </a:extLst>
+          </p:cNvPr>
+          <p:cNvPicPr>
+            <a:picLocks noChangeAspect="1"/>
+          </p:cNvPicPr>
+          <p:nvPr/>
+        </p:nvPicPr>
+        <p:blipFill>
+          <a:blip r:embed="rId2">
+            <a:extLst>
+              <a:ext uri="{96DAC541-7B7A-43D3-8B79-37D633B846F1}">
+                <asvg:svgBlip xmlns:asvg="http://schemas.microsoft.com/office/drawing/2016/SVG/main" r:embed="rId3"/>
+              </a:ext>
+            </a:extLst>
+          </a:blip>
+          <a:stretch>
+            <a:fillRect/>
+          </a:stretch>
+        </p:blipFill>
+        <p:spPr>
+          <a:xfrm>
+            <a:off x="92629" y="429832"/>
+            <a:ext cx="878772" cy="878772"/>
+          </a:xfrm>
+          <a:prstGeom prst="rect">
+            <a:avLst/>
+          </a:prstGeom>
+        </p:spPr>
+      </p:pic>
+      <p:pic>
+        <p:nvPicPr>
+          <p:cNvPr id="5" name="Graphic 4" descr="Gears with solid fill">
+            <a:extLst>
+              <a:ext uri="{FF2B5EF4-FFF2-40B4-BE49-F238E27FC236}">
+                <a16:creationId xmlns:a16="http://schemas.microsoft.com/office/drawing/2014/main" id="{71D8B607-23B4-4B0C-C648-DA3E04FDB095}"/>
+              </a:ext>
+            </a:extLst>
+          </p:cNvPr>
+          <p:cNvPicPr>
+            <a:picLocks noChangeAspect="1"/>
+          </p:cNvPicPr>
+          <p:nvPr/>
+        </p:nvPicPr>
+        <p:blipFill>
+          <a:blip r:embed="rId4">
+            <a:extLst>
+              <a:ext uri="{96DAC541-7B7A-43D3-8B79-37D633B846F1}">
+                <asvg:svgBlip xmlns:asvg="http://schemas.microsoft.com/office/drawing/2016/SVG/main" r:embed="rId5"/>
+              </a:ext>
+            </a:extLst>
+          </a:blip>
+          <a:stretch>
+            <a:fillRect/>
+          </a:stretch>
+        </p:blipFill>
+        <p:spPr>
+          <a:xfrm>
+            <a:off x="57001" y="2754228"/>
+            <a:ext cx="914400" cy="914400"/>
+          </a:xfrm>
+          <a:prstGeom prst="rect">
+            <a:avLst/>
+          </a:prstGeom>
+        </p:spPr>
+      </p:pic>
+      <p:pic>
+        <p:nvPicPr>
+          <p:cNvPr id="6" name="Graphic 5" descr="Graduation cap with solid fill">
+            <a:extLst>
+              <a:ext uri="{FF2B5EF4-FFF2-40B4-BE49-F238E27FC236}">
+                <a16:creationId xmlns:a16="http://schemas.microsoft.com/office/drawing/2014/main" id="{2FDEC35A-BF00-F57D-B9E9-157ED4B8F240}"/>
+              </a:ext>
+            </a:extLst>
+          </p:cNvPr>
+          <p:cNvPicPr>
+            <a:picLocks noChangeAspect="1"/>
+          </p:cNvPicPr>
+          <p:nvPr/>
+        </p:nvPicPr>
+        <p:blipFill>
+          <a:blip r:embed="rId6">
+            <a:extLst>
+              <a:ext uri="{96DAC541-7B7A-43D3-8B79-37D633B846F1}">
+                <asvg:svgBlip xmlns:asvg="http://schemas.microsoft.com/office/drawing/2016/SVG/main" r:embed="rId7"/>
+              </a:ext>
+            </a:extLst>
+          </a:blip>
+          <a:stretch>
+            <a:fillRect/>
+          </a:stretch>
+        </p:blipFill>
+        <p:spPr>
+          <a:xfrm>
+            <a:off x="75616" y="1967554"/>
+            <a:ext cx="914400" cy="914400"/>
+          </a:xfrm>
+          <a:prstGeom prst="rect">
+            <a:avLst/>
+          </a:prstGeom>
+        </p:spPr>
+      </p:pic>
+      <p:pic>
+        <p:nvPicPr>
+          <p:cNvPr id="7" name="Graphic 6" descr="Marker with solid fill">
+            <a:extLst>
+              <a:ext uri="{FF2B5EF4-FFF2-40B4-BE49-F238E27FC236}">
+                <a16:creationId xmlns:a16="http://schemas.microsoft.com/office/drawing/2014/main" id="{39FB9C8A-8210-E646-A726-1DD13068BAC6}"/>
+              </a:ext>
+            </a:extLst>
+          </p:cNvPr>
+          <p:cNvPicPr>
+            <a:picLocks noChangeAspect="1"/>
+          </p:cNvPicPr>
+          <p:nvPr/>
+        </p:nvPicPr>
+        <p:blipFill>
+          <a:blip r:embed="rId8">
+            <a:extLst>
+              <a:ext uri="{96DAC541-7B7A-43D3-8B79-37D633B846F1}">
+                <asvg:svgBlip xmlns:asvg="http://schemas.microsoft.com/office/drawing/2016/SVG/main" r:embed="rId9"/>
+              </a:ext>
+            </a:extLst>
+          </a:blip>
+          <a:stretch>
+            <a:fillRect/>
+          </a:stretch>
+        </p:blipFill>
+        <p:spPr>
+          <a:xfrm>
+            <a:off x="94231" y="1180879"/>
+            <a:ext cx="914400" cy="914400"/>
+          </a:xfrm>
+          <a:prstGeom prst="rect">
+            <a:avLst/>
+          </a:prstGeom>
+        </p:spPr>
+      </p:pic>
+      <p:pic>
+        <p:nvPicPr>
+          <p:cNvPr id="8" name="Graphic 7" descr="Magnifying glass with solid fill">
+            <a:extLst>
+              <a:ext uri="{FF2B5EF4-FFF2-40B4-BE49-F238E27FC236}">
+                <a16:creationId xmlns:a16="http://schemas.microsoft.com/office/drawing/2014/main" id="{ED2126E2-7607-DE6F-C758-A399993D6183}"/>
+              </a:ext>
+            </a:extLst>
+          </p:cNvPr>
+          <p:cNvPicPr>
+            <a:picLocks noChangeAspect="1"/>
+          </p:cNvPicPr>
+          <p:nvPr/>
+        </p:nvPicPr>
+        <p:blipFill>
+          <a:blip r:embed="rId10">
+            <a:extLst>
+              <a:ext uri="{96DAC541-7B7A-43D3-8B79-37D633B846F1}">
+                <asvg:svgBlip xmlns:asvg="http://schemas.microsoft.com/office/drawing/2016/SVG/main" r:embed="rId11"/>
+              </a:ext>
+            </a:extLst>
+          </a:blip>
+          <a:stretch>
+            <a:fillRect/>
+          </a:stretch>
+        </p:blipFill>
+        <p:spPr>
+          <a:xfrm>
+            <a:off x="1764340" y="429832"/>
+            <a:ext cx="878772" cy="878772"/>
+          </a:xfrm>
+          <a:prstGeom prst="rect">
+            <a:avLst/>
+          </a:prstGeom>
+        </p:spPr>
+      </p:pic>
+      <p:pic>
+        <p:nvPicPr>
+          <p:cNvPr id="9" name="Graphic 8" descr="Gears with solid fill">
+            <a:extLst>
+              <a:ext uri="{FF2B5EF4-FFF2-40B4-BE49-F238E27FC236}">
+                <a16:creationId xmlns:a16="http://schemas.microsoft.com/office/drawing/2014/main" id="{76924BAA-2E00-CB0B-043C-A0F667366404}"/>
+              </a:ext>
+            </a:extLst>
+          </p:cNvPr>
+          <p:cNvPicPr>
+            <a:picLocks noChangeAspect="1"/>
+          </p:cNvPicPr>
+          <p:nvPr/>
+        </p:nvPicPr>
+        <p:blipFill>
+          <a:blip r:embed="rId12">
+            <a:extLst>
+              <a:ext uri="{96DAC541-7B7A-43D3-8B79-37D633B846F1}">
+                <asvg:svgBlip xmlns:asvg="http://schemas.microsoft.com/office/drawing/2016/SVG/main" r:embed="rId13"/>
+              </a:ext>
+            </a:extLst>
+          </a:blip>
+          <a:stretch>
+            <a:fillRect/>
+          </a:stretch>
+        </p:blipFill>
+        <p:spPr>
+          <a:xfrm>
+            <a:off x="1728712" y="2754228"/>
+            <a:ext cx="914400" cy="914400"/>
+          </a:xfrm>
+          <a:prstGeom prst="rect">
+            <a:avLst/>
+          </a:prstGeom>
+        </p:spPr>
+      </p:pic>
+      <p:pic>
+        <p:nvPicPr>
+          <p:cNvPr id="10" name="Graphic 9" descr="Graduation cap with solid fill">
+            <a:extLst>
+              <a:ext uri="{FF2B5EF4-FFF2-40B4-BE49-F238E27FC236}">
+                <a16:creationId xmlns:a16="http://schemas.microsoft.com/office/drawing/2014/main" id="{DC99F8FB-578C-B7F7-7AF5-E0079162408A}"/>
+              </a:ext>
+            </a:extLst>
+          </p:cNvPr>
+          <p:cNvPicPr>
+            <a:picLocks noChangeAspect="1"/>
+          </p:cNvPicPr>
+          <p:nvPr/>
+        </p:nvPicPr>
+        <p:blipFill>
+          <a:blip r:embed="rId14">
+            <a:extLst>
+              <a:ext uri="{96DAC541-7B7A-43D3-8B79-37D633B846F1}">
+                <asvg:svgBlip xmlns:asvg="http://schemas.microsoft.com/office/drawing/2016/SVG/main" r:embed="rId15"/>
+              </a:ext>
+            </a:extLst>
+          </a:blip>
+          <a:stretch>
+            <a:fillRect/>
+          </a:stretch>
+        </p:blipFill>
+        <p:spPr>
+          <a:xfrm>
+            <a:off x="1747327" y="1967554"/>
+            <a:ext cx="914400" cy="914400"/>
+          </a:xfrm>
+          <a:prstGeom prst="rect">
+            <a:avLst/>
+          </a:prstGeom>
+        </p:spPr>
+      </p:pic>
+      <p:pic>
+        <p:nvPicPr>
+          <p:cNvPr id="11" name="Graphic 10" descr="Marker with solid fill">
+            <a:extLst>
+              <a:ext uri="{FF2B5EF4-FFF2-40B4-BE49-F238E27FC236}">
+                <a16:creationId xmlns:a16="http://schemas.microsoft.com/office/drawing/2014/main" id="{049D9FA1-7781-8FA3-C16A-BD6BF32B25EB}"/>
+              </a:ext>
+            </a:extLst>
+          </p:cNvPr>
+          <p:cNvPicPr>
+            <a:picLocks noChangeAspect="1"/>
+          </p:cNvPicPr>
+          <p:nvPr/>
+        </p:nvPicPr>
+        <p:blipFill>
+          <a:blip r:embed="rId16">
+            <a:extLst>
+              <a:ext uri="{96DAC541-7B7A-43D3-8B79-37D633B846F1}">
+                <asvg:svgBlip xmlns:asvg="http://schemas.microsoft.com/office/drawing/2016/SVG/main" r:embed="rId17"/>
+              </a:ext>
+            </a:extLst>
+          </a:blip>
+          <a:stretch>
+            <a:fillRect/>
+          </a:stretch>
+        </p:blipFill>
+        <p:spPr>
+          <a:xfrm>
+            <a:off x="1765942" y="1180879"/>
+            <a:ext cx="914400" cy="914400"/>
+          </a:xfrm>
+          <a:prstGeom prst="rect">
+            <a:avLst/>
+          </a:prstGeom>
+        </p:spPr>
+      </p:pic>
+    </p:spTree>
+    <p:extLst>
+      <p:ext uri="{BB962C8B-B14F-4D97-AF65-F5344CB8AC3E}">
+        <p14:creationId xmlns:p14="http://schemas.microsoft.com/office/powerpoint/2010/main" val="1646056652"/>
+      </p:ext>
+    </p:extLst>
+  </p:cSld>
+  <p:clrMapOvr>
+    <a:masterClrMapping/>
+  </p:clrMapOvr>
+</p:sld>
+</file>
+
 <file path=ppt/theme/theme1.xml><?xml version="1.0" encoding="utf-8"?>
 <a:theme xmlns:a="http://schemas.openxmlformats.org/drawingml/2006/main" name="Office 2013 - 2022 Theme">
   <a:themeElements>
-    <a:clrScheme name="Custom 1">
+    <a:clrScheme name="Office 2013 - 2022 Theme">
       <a:dk1>
         <a:sysClr val="windowText" lastClr="000000"/>
       </a:dk1>
@@ -4318,34 +6133,34 @@
         <a:sysClr val="window" lastClr="FFFFFF"/>
       </a:lt1>
       <a:dk2>
-        <a:srgbClr val="212745"/>
+        <a:srgbClr val="44546A"/>
       </a:dk2>
       <a:lt2>
-        <a:srgbClr val="B4DCFA"/>
+        <a:srgbClr val="E7E6E6"/>
       </a:lt2>
       <a:accent1>
-        <a:srgbClr val="00529C"/>
+        <a:srgbClr val="4472C4"/>
       </a:accent1>
       <a:accent2>
-        <a:srgbClr val="5ECCF3"/>
+        <a:srgbClr val="ED7D31"/>
       </a:accent2>
       <a:accent3>
-        <a:srgbClr val="A7EA52"/>
+        <a:srgbClr val="A5A5A5"/>
       </a:accent3>
       <a:accent4>
-        <a:srgbClr val="5DCEAF"/>
+        <a:srgbClr val="FFC000"/>
       </a:accent4>
       <a:accent5>
-        <a:srgbClr val="FF8021"/>
+        <a:srgbClr val="5B9BD5"/>
       </a:accent5>
       <a:accent6>
-        <a:srgbClr val="E0144C"/>
+        <a:srgbClr val="70AD47"/>
       </a:accent6>
       <a:hlink>
-        <a:srgbClr val="56C7AA"/>
+        <a:srgbClr val="0563C1"/>
       </a:hlink>
       <a:folHlink>
-        <a:srgbClr val="59A8D1"/>
+        <a:srgbClr val="954F72"/>
       </a:folHlink>
     </a:clrScheme>
     <a:fontScheme name="Office 2013 - 2022 Theme">

</xml_diff>